<commit_message>
Update tradeoff and ellipsoid figures
</commit_message>
<xml_diff>
--- a/images/budgeted/tradeoff.pptx
+++ b/images/budgeted/tradeoff.pptx
@@ -6,6 +6,7 @@
   </p:sldMasterIdLst>
   <p:sldIdLst>
     <p:sldId id="256" r:id="rId2"/>
+    <p:sldId id="257" r:id="rId3"/>
   </p:sldIdLst>
   <p:sldSz cx="5759450" cy="4319588"/>
   <p:notesSz cx="6858000" cy="9144000"/>
@@ -104,6 +105,11 @@
       </a:defRPr>
     </a:lvl9pPr>
   </p:defaultTextStyle>
+  <p:extLst>
+    <p:ext uri="{EFAFB233-063F-42B5-8137-9DF3F51BA10A}">
+      <p15:sldGuideLst xmlns:p15="http://schemas.microsoft.com/office/powerpoint/2012/main"/>
+    </p:ext>
+  </p:extLst>
 </p:presentation>
 </file>
 
@@ -238,7 +244,7 @@
           <a:p>
             <a:fld id="{3C7FAA56-3E01-433A-B52A-D557E5D96E4D}" type="datetimeFigureOut">
               <a:rPr lang="en-GB" smtClean="0"/>
-              <a:t>09/10/2020</a:t>
+              <a:t>13/10/2020</a:t>
             </a:fld>
             <a:endParaRPr lang="en-GB"/>
           </a:p>
@@ -408,7 +414,7 @@
           <a:p>
             <a:fld id="{3C7FAA56-3E01-433A-B52A-D557E5D96E4D}" type="datetimeFigureOut">
               <a:rPr lang="en-GB" smtClean="0"/>
-              <a:t>09/10/2020</a:t>
+              <a:t>13/10/2020</a:t>
             </a:fld>
             <a:endParaRPr lang="en-GB"/>
           </a:p>
@@ -588,7 +594,7 @@
           <a:p>
             <a:fld id="{3C7FAA56-3E01-433A-B52A-D557E5D96E4D}" type="datetimeFigureOut">
               <a:rPr lang="en-GB" smtClean="0"/>
-              <a:t>09/10/2020</a:t>
+              <a:t>13/10/2020</a:t>
             </a:fld>
             <a:endParaRPr lang="en-GB"/>
           </a:p>
@@ -758,7 +764,7 @@
           <a:p>
             <a:fld id="{3C7FAA56-3E01-433A-B52A-D557E5D96E4D}" type="datetimeFigureOut">
               <a:rPr lang="en-GB" smtClean="0"/>
-              <a:t>09/10/2020</a:t>
+              <a:t>13/10/2020</a:t>
             </a:fld>
             <a:endParaRPr lang="en-GB"/>
           </a:p>
@@ -1002,7 +1008,7 @@
           <a:p>
             <a:fld id="{3C7FAA56-3E01-433A-B52A-D557E5D96E4D}" type="datetimeFigureOut">
               <a:rPr lang="en-GB" smtClean="0"/>
-              <a:t>09/10/2020</a:t>
+              <a:t>13/10/2020</a:t>
             </a:fld>
             <a:endParaRPr lang="en-GB"/>
           </a:p>
@@ -1234,7 +1240,7 @@
           <a:p>
             <a:fld id="{3C7FAA56-3E01-433A-B52A-D557E5D96E4D}" type="datetimeFigureOut">
               <a:rPr lang="en-GB" smtClean="0"/>
-              <a:t>09/10/2020</a:t>
+              <a:t>13/10/2020</a:t>
             </a:fld>
             <a:endParaRPr lang="en-GB"/>
           </a:p>
@@ -1601,7 +1607,7 @@
           <a:p>
             <a:fld id="{3C7FAA56-3E01-433A-B52A-D557E5D96E4D}" type="datetimeFigureOut">
               <a:rPr lang="en-GB" smtClean="0"/>
-              <a:t>09/10/2020</a:t>
+              <a:t>13/10/2020</a:t>
             </a:fld>
             <a:endParaRPr lang="en-GB"/>
           </a:p>
@@ -1719,7 +1725,7 @@
           <a:p>
             <a:fld id="{3C7FAA56-3E01-433A-B52A-D557E5D96E4D}" type="datetimeFigureOut">
               <a:rPr lang="en-GB" smtClean="0"/>
-              <a:t>09/10/2020</a:t>
+              <a:t>13/10/2020</a:t>
             </a:fld>
             <a:endParaRPr lang="en-GB"/>
           </a:p>
@@ -1814,7 +1820,7 @@
           <a:p>
             <a:fld id="{3C7FAA56-3E01-433A-B52A-D557E5D96E4D}" type="datetimeFigureOut">
               <a:rPr lang="en-GB" smtClean="0"/>
-              <a:t>09/10/2020</a:t>
+              <a:t>13/10/2020</a:t>
             </a:fld>
             <a:endParaRPr lang="en-GB"/>
           </a:p>
@@ -2091,7 +2097,7 @@
           <a:p>
             <a:fld id="{3C7FAA56-3E01-433A-B52A-D557E5D96E4D}" type="datetimeFigureOut">
               <a:rPr lang="en-GB" smtClean="0"/>
-              <a:t>09/10/2020</a:t>
+              <a:t>13/10/2020</a:t>
             </a:fld>
             <a:endParaRPr lang="en-GB"/>
           </a:p>
@@ -2348,7 +2354,7 @@
           <a:p>
             <a:fld id="{3C7FAA56-3E01-433A-B52A-D557E5D96E4D}" type="datetimeFigureOut">
               <a:rPr lang="en-GB" smtClean="0"/>
-              <a:t>09/10/2020</a:t>
+              <a:t>13/10/2020</a:t>
             </a:fld>
             <a:endParaRPr lang="en-GB"/>
           </a:p>
@@ -2561,7 +2567,7 @@
           <a:p>
             <a:fld id="{3C7FAA56-3E01-433A-B52A-D557E5D96E4D}" type="datetimeFigureOut">
               <a:rPr lang="en-GB" smtClean="0"/>
-              <a:t>09/10/2020</a:t>
+              <a:t>13/10/2020</a:t>
             </a:fld>
             <a:endParaRPr lang="en-GB"/>
           </a:p>
@@ -4261,8 +4267,8 @@
           <a:effectLst/>
         </p:spPr>
       </p:cxnSp>
-      <mc:AlternateContent xmlns:mc="http://schemas.openxmlformats.org/markup-compatibility/2006">
-        <mc:Choice xmlns:a14="http://schemas.microsoft.com/office/drawing/2010/main" Requires="a14">
+      <mc:AlternateContent xmlns:mc="http://schemas.openxmlformats.org/markup-compatibility/2006" xmlns:a14="http://schemas.microsoft.com/office/drawing/2010/main">
+        <mc:Choice Requires="a14">
           <p:sp>
             <p:nvSpPr>
               <p:cNvPr id="16" name="ZoneTexte 15">
@@ -4294,6 +4300,7 @@
               </a:bodyPr>
               <a:lstStyle/>
               <a:p>
+                <a:pPr/>
                 <a14:m>
                   <m:oMathPara xmlns:m="http://schemas.openxmlformats.org/officeDocument/2006/math">
                     <m:oMathParaPr>
@@ -4303,18 +4310,24 @@
                       <m:sSup>
                         <m:sSupPr>
                           <m:ctrlPr>
-                            <a:rPr lang="fr-FR" i="1"/>
+                            <a:rPr lang="fr-FR" i="1">
+                              <a:latin typeface="Cambria Math" panose="02040503050406030204" pitchFamily="18" charset="0"/>
+                            </a:rPr>
                           </m:ctrlPr>
                         </m:sSupPr>
                         <m:e>
                           <m:r>
-                            <a:rPr lang="fr-FR" i="1"/>
+                            <a:rPr lang="fr-FR" i="1">
+                              <a:latin typeface="Cambria Math" panose="02040503050406030204" pitchFamily="18" charset="0"/>
+                            </a:rPr>
                             <m:t>𝜋</m:t>
                           </m:r>
                         </m:e>
                         <m:sup>
                           <m:r>
-                            <a:rPr lang="fr-FR" i="1"/>
+                            <a:rPr lang="fr-FR" i="1">
+                              <a:latin typeface="Cambria Math" panose="02040503050406030204" pitchFamily="18" charset="0"/>
+                            </a:rPr>
                             <m:t>⋆</m:t>
                           </m:r>
                         </m:sup>
@@ -4327,7 +4340,7 @@
             </p:txBody>
           </p:sp>
         </mc:Choice>
-        <mc:Fallback>
+        <mc:Fallback xmlns="">
           <p:sp>
             <p:nvSpPr>
               <p:cNvPr id="16" name="ZoneTexte 15">
@@ -4557,6 +4570,2142 @@
     <p:extLst>
       <p:ext uri="{BB962C8B-B14F-4D97-AF65-F5344CB8AC3E}">
         <p14:creationId xmlns:p14="http://schemas.microsoft.com/office/powerpoint/2010/main" val="884650510"/>
+      </p:ext>
+    </p:extLst>
+  </p:cSld>
+  <p:clrMapOvr>
+    <a:masterClrMapping/>
+  </p:clrMapOvr>
+</p:sld>
+</file>
+
+<file path=ppt/slides/slide2.xml><?xml version="1.0" encoding="utf-8"?>
+<p:sld xmlns:a="http://schemas.openxmlformats.org/drawingml/2006/main" xmlns:r="http://schemas.openxmlformats.org/officeDocument/2006/relationships" xmlns:p="http://schemas.openxmlformats.org/presentationml/2006/main">
+  <p:cSld>
+    <p:spTree>
+      <p:nvGrpSpPr>
+        <p:cNvPr id="1" name=""/>
+        <p:cNvGrpSpPr/>
+        <p:nvPr/>
+      </p:nvGrpSpPr>
+      <p:grpSpPr>
+        <a:xfrm>
+          <a:off x="0" y="0"/>
+          <a:ext cx="0" cy="0"/>
+          <a:chOff x="0" y="0"/>
+          <a:chExt cx="0" cy="0"/>
+        </a:xfrm>
+      </p:grpSpPr>
+      <p:cxnSp>
+        <p:nvCxnSpPr>
+          <p:cNvPr id="5" name="Connecteur droit avec flèche 4">
+            <a:extLst>
+              <a:ext uri="{FF2B5EF4-FFF2-40B4-BE49-F238E27FC236}">
+                <a16:creationId xmlns:a16="http://schemas.microsoft.com/office/drawing/2014/main" id="{1C73F00D-382C-480F-9D6B-BEB651B2EDB1}"/>
+              </a:ext>
+            </a:extLst>
+          </p:cNvPr>
+          <p:cNvCxnSpPr>
+            <a:cxnSpLocks/>
+          </p:cNvCxnSpPr>
+          <p:nvPr/>
+        </p:nvCxnSpPr>
+        <p:spPr>
+          <a:xfrm flipV="1">
+            <a:off x="213761" y="342774"/>
+            <a:ext cx="0" cy="3633435"/>
+          </a:xfrm>
+          <a:prstGeom prst="straightConnector1">
+            <a:avLst/>
+          </a:prstGeom>
+          <a:noFill/>
+          <a:ln w="12700" cap="flat" cmpd="sng" algn="ctr">
+            <a:solidFill>
+              <a:schemeClr val="tx1">
+                <a:lumMod val="95000"/>
+              </a:schemeClr>
+            </a:solidFill>
+            <a:prstDash val="solid"/>
+            <a:headEnd type="oval"/>
+            <a:tailEnd type="triangle"/>
+          </a:ln>
+          <a:effectLst/>
+        </p:spPr>
+      </p:cxnSp>
+      <p:cxnSp>
+        <p:nvCxnSpPr>
+          <p:cNvPr id="6" name="Connecteur droit avec flèche 5">
+            <a:extLst>
+              <a:ext uri="{FF2B5EF4-FFF2-40B4-BE49-F238E27FC236}">
+                <a16:creationId xmlns:a16="http://schemas.microsoft.com/office/drawing/2014/main" id="{C10F065F-C080-4051-8A0A-AFC3AE6203E1}"/>
+              </a:ext>
+            </a:extLst>
+          </p:cNvPr>
+          <p:cNvCxnSpPr>
+            <a:cxnSpLocks/>
+          </p:cNvCxnSpPr>
+          <p:nvPr/>
+        </p:nvCxnSpPr>
+        <p:spPr>
+          <a:xfrm>
+            <a:off x="213761" y="3976208"/>
+            <a:ext cx="5406827" cy="0"/>
+          </a:xfrm>
+          <a:prstGeom prst="straightConnector1">
+            <a:avLst/>
+          </a:prstGeom>
+          <a:noFill/>
+          <a:ln w="12700" cap="flat" cmpd="sng" algn="ctr">
+            <a:solidFill>
+              <a:schemeClr val="tx1">
+                <a:lumMod val="95000"/>
+              </a:schemeClr>
+            </a:solidFill>
+            <a:prstDash val="solid"/>
+            <a:headEnd type="oval"/>
+            <a:tailEnd type="triangle"/>
+          </a:ln>
+          <a:effectLst/>
+        </p:spPr>
+      </p:cxnSp>
+      <p:sp>
+        <p:nvSpPr>
+          <p:cNvPr id="7" name="ZoneTexte 6">
+            <a:extLst>
+              <a:ext uri="{FF2B5EF4-FFF2-40B4-BE49-F238E27FC236}">
+                <a16:creationId xmlns:a16="http://schemas.microsoft.com/office/drawing/2014/main" id="{3A4E3E48-8608-476E-A85F-61CF169515FA}"/>
+              </a:ext>
+            </a:extLst>
+          </p:cNvPr>
+          <p:cNvSpPr txBox="1"/>
+          <p:nvPr/>
+        </p:nvSpPr>
+        <p:spPr>
+          <a:xfrm>
+            <a:off x="329829" y="272099"/>
+            <a:ext cx="1240817" cy="400110"/>
+          </a:xfrm>
+          <a:prstGeom prst="rect">
+            <a:avLst/>
+          </a:prstGeom>
+          <a:noFill/>
+        </p:spPr>
+        <p:txBody>
+          <a:bodyPr wrap="square" rtlCol="0">
+            <a:spAutoFit/>
+          </a:bodyPr>
+          <a:lstStyle/>
+          <a:p>
+            <a:pPr defTabSz="914400"/>
+            <a:r>
+              <a:rPr lang="fr-FR" sz="2000" kern="0" dirty="0" err="1">
+                <a:solidFill>
+                  <a:srgbClr val="90E838"/>
+                </a:solidFill>
+              </a:rPr>
+              <a:t>Efficiency</a:t>
+            </a:r>
+            <a:endParaRPr lang="fr-FR" sz="2000" kern="0" dirty="0">
+              <a:solidFill>
+                <a:srgbClr val="90E838"/>
+              </a:solidFill>
+            </a:endParaRPr>
+          </a:p>
+        </p:txBody>
+      </p:sp>
+      <p:sp>
+        <p:nvSpPr>
+          <p:cNvPr id="8" name="ZoneTexte 7">
+            <a:extLst>
+              <a:ext uri="{FF2B5EF4-FFF2-40B4-BE49-F238E27FC236}">
+                <a16:creationId xmlns:a16="http://schemas.microsoft.com/office/drawing/2014/main" id="{10C6F61E-7564-40FD-B234-4870B688CDE6}"/>
+              </a:ext>
+            </a:extLst>
+          </p:cNvPr>
+          <p:cNvSpPr txBox="1"/>
+          <p:nvPr/>
+        </p:nvSpPr>
+        <p:spPr>
+          <a:xfrm>
+            <a:off x="5065283" y="3497335"/>
+            <a:ext cx="611683" cy="369332"/>
+          </a:xfrm>
+          <a:prstGeom prst="rect">
+            <a:avLst/>
+          </a:prstGeom>
+          <a:noFill/>
+        </p:spPr>
+        <p:txBody>
+          <a:bodyPr wrap="square" rtlCol="0">
+            <a:spAutoFit/>
+          </a:bodyPr>
+          <a:lstStyle/>
+          <a:p>
+            <a:pPr defTabSz="914400"/>
+            <a:r>
+              <a:rPr lang="fr-FR" sz="1800" kern="0" dirty="0">
+                <a:solidFill>
+                  <a:srgbClr val="E63312"/>
+                </a:solidFill>
+              </a:rPr>
+              <a:t>Risk</a:t>
+            </a:r>
+            <a:endParaRPr lang="fr-FR" sz="1400" kern="0" dirty="0">
+              <a:solidFill>
+                <a:srgbClr val="E63312"/>
+              </a:solidFill>
+            </a:endParaRPr>
+          </a:p>
+        </p:txBody>
+      </p:sp>
+      <p:sp>
+        <p:nvSpPr>
+          <p:cNvPr id="10" name="Rectangle 16">
+            <a:extLst>
+              <a:ext uri="{FF2B5EF4-FFF2-40B4-BE49-F238E27FC236}">
+                <a16:creationId xmlns:a16="http://schemas.microsoft.com/office/drawing/2014/main" id="{E81BE21C-8DFA-4781-AAA2-D6E62BC2059C}"/>
+              </a:ext>
+            </a:extLst>
+          </p:cNvPr>
+          <p:cNvSpPr/>
+          <p:nvPr/>
+        </p:nvSpPr>
+        <p:spPr>
+          <a:xfrm flipH="1">
+            <a:off x="970109" y="994388"/>
+            <a:ext cx="3693360" cy="2737574"/>
+          </a:xfrm>
+          <a:custGeom>
+            <a:avLst/>
+            <a:gdLst>
+              <a:gd name="connsiteX0" fmla="*/ 0 w 4924323"/>
+              <a:gd name="connsiteY0" fmla="*/ 0 h 3649982"/>
+              <a:gd name="connsiteX1" fmla="*/ 4924323 w 4924323"/>
+              <a:gd name="connsiteY1" fmla="*/ 0 h 3649982"/>
+              <a:gd name="connsiteX2" fmla="*/ 4924323 w 4924323"/>
+              <a:gd name="connsiteY2" fmla="*/ 3649982 h 3649982"/>
+              <a:gd name="connsiteX3" fmla="*/ 0 w 4924323"/>
+              <a:gd name="connsiteY3" fmla="*/ 3649982 h 3649982"/>
+              <a:gd name="connsiteX4" fmla="*/ 0 w 4924323"/>
+              <a:gd name="connsiteY4" fmla="*/ 0 h 3649982"/>
+              <a:gd name="connsiteX0" fmla="*/ 0 w 4924323"/>
+              <a:gd name="connsiteY0" fmla="*/ 0 h 3649982"/>
+              <a:gd name="connsiteX1" fmla="*/ 2650906 w 4924323"/>
+              <a:gd name="connsiteY1" fmla="*/ 1543574 h 3649982"/>
+              <a:gd name="connsiteX2" fmla="*/ 4924323 w 4924323"/>
+              <a:gd name="connsiteY2" fmla="*/ 3649982 h 3649982"/>
+              <a:gd name="connsiteX3" fmla="*/ 0 w 4924323"/>
+              <a:gd name="connsiteY3" fmla="*/ 3649982 h 3649982"/>
+              <a:gd name="connsiteX4" fmla="*/ 0 w 4924323"/>
+              <a:gd name="connsiteY4" fmla="*/ 0 h 3649982"/>
+              <a:gd name="connsiteX0" fmla="*/ 0 w 4924323"/>
+              <a:gd name="connsiteY0" fmla="*/ 0 h 3649982"/>
+              <a:gd name="connsiteX1" fmla="*/ 2650906 w 4924323"/>
+              <a:gd name="connsiteY1" fmla="*/ 1543574 h 3649982"/>
+              <a:gd name="connsiteX2" fmla="*/ 4924323 w 4924323"/>
+              <a:gd name="connsiteY2" fmla="*/ 3649982 h 3649982"/>
+              <a:gd name="connsiteX3" fmla="*/ 0 w 4924323"/>
+              <a:gd name="connsiteY3" fmla="*/ 3649982 h 3649982"/>
+              <a:gd name="connsiteX4" fmla="*/ 0 w 4924323"/>
+              <a:gd name="connsiteY4" fmla="*/ 0 h 3649982"/>
+              <a:gd name="connsiteX0" fmla="*/ 0 w 4924323"/>
+              <a:gd name="connsiteY0" fmla="*/ 0 h 3649982"/>
+              <a:gd name="connsiteX1" fmla="*/ 2650906 w 4924323"/>
+              <a:gd name="connsiteY1" fmla="*/ 1543574 h 3649982"/>
+              <a:gd name="connsiteX2" fmla="*/ 4924323 w 4924323"/>
+              <a:gd name="connsiteY2" fmla="*/ 3649982 h 3649982"/>
+              <a:gd name="connsiteX3" fmla="*/ 0 w 4924323"/>
+              <a:gd name="connsiteY3" fmla="*/ 3649982 h 3649982"/>
+              <a:gd name="connsiteX4" fmla="*/ 0 w 4924323"/>
+              <a:gd name="connsiteY4" fmla="*/ 0 h 3649982"/>
+              <a:gd name="connsiteX0" fmla="*/ 0 w 4924323"/>
+              <a:gd name="connsiteY0" fmla="*/ 56410 h 3706392"/>
+              <a:gd name="connsiteX1" fmla="*/ 2650906 w 4924323"/>
+              <a:gd name="connsiteY1" fmla="*/ 1599984 h 3706392"/>
+              <a:gd name="connsiteX2" fmla="*/ 4924323 w 4924323"/>
+              <a:gd name="connsiteY2" fmla="*/ 3706392 h 3706392"/>
+              <a:gd name="connsiteX3" fmla="*/ 0 w 4924323"/>
+              <a:gd name="connsiteY3" fmla="*/ 3706392 h 3706392"/>
+              <a:gd name="connsiteX4" fmla="*/ 0 w 4924323"/>
+              <a:gd name="connsiteY4" fmla="*/ 56410 h 3706392"/>
+              <a:gd name="connsiteX0" fmla="*/ 0 w 4924323"/>
+              <a:gd name="connsiteY0" fmla="*/ 63809 h 3713791"/>
+              <a:gd name="connsiteX1" fmla="*/ 2650906 w 4924323"/>
+              <a:gd name="connsiteY1" fmla="*/ 1607383 h 3713791"/>
+              <a:gd name="connsiteX2" fmla="*/ 4924323 w 4924323"/>
+              <a:gd name="connsiteY2" fmla="*/ 3713791 h 3713791"/>
+              <a:gd name="connsiteX3" fmla="*/ 0 w 4924323"/>
+              <a:gd name="connsiteY3" fmla="*/ 3713791 h 3713791"/>
+              <a:gd name="connsiteX4" fmla="*/ 0 w 4924323"/>
+              <a:gd name="connsiteY4" fmla="*/ 63809 h 3713791"/>
+              <a:gd name="connsiteX0" fmla="*/ 0 w 4924323"/>
+              <a:gd name="connsiteY0" fmla="*/ 0 h 3649982"/>
+              <a:gd name="connsiteX1" fmla="*/ 2650906 w 4924323"/>
+              <a:gd name="connsiteY1" fmla="*/ 1543574 h 3649982"/>
+              <a:gd name="connsiteX2" fmla="*/ 4924323 w 4924323"/>
+              <a:gd name="connsiteY2" fmla="*/ 3649982 h 3649982"/>
+              <a:gd name="connsiteX3" fmla="*/ 0 w 4924323"/>
+              <a:gd name="connsiteY3" fmla="*/ 3649982 h 3649982"/>
+              <a:gd name="connsiteX4" fmla="*/ 0 w 4924323"/>
+              <a:gd name="connsiteY4" fmla="*/ 0 h 3649982"/>
+              <a:gd name="connsiteX0" fmla="*/ 0 w 4924323"/>
+              <a:gd name="connsiteY0" fmla="*/ 0 h 3649982"/>
+              <a:gd name="connsiteX1" fmla="*/ 3305247 w 4924323"/>
+              <a:gd name="connsiteY1" fmla="*/ 1333849 h 3649982"/>
+              <a:gd name="connsiteX2" fmla="*/ 4924323 w 4924323"/>
+              <a:gd name="connsiteY2" fmla="*/ 3649982 h 3649982"/>
+              <a:gd name="connsiteX3" fmla="*/ 0 w 4924323"/>
+              <a:gd name="connsiteY3" fmla="*/ 3649982 h 3649982"/>
+              <a:gd name="connsiteX4" fmla="*/ 0 w 4924323"/>
+              <a:gd name="connsiteY4" fmla="*/ 0 h 3649982"/>
+              <a:gd name="connsiteX0" fmla="*/ 0 w 4924323"/>
+              <a:gd name="connsiteY0" fmla="*/ 0 h 3649982"/>
+              <a:gd name="connsiteX1" fmla="*/ 3305247 w 4924323"/>
+              <a:gd name="connsiteY1" fmla="*/ 1333849 h 3649982"/>
+              <a:gd name="connsiteX2" fmla="*/ 4924323 w 4924323"/>
+              <a:gd name="connsiteY2" fmla="*/ 3649982 h 3649982"/>
+              <a:gd name="connsiteX3" fmla="*/ 0 w 4924323"/>
+              <a:gd name="connsiteY3" fmla="*/ 3649982 h 3649982"/>
+              <a:gd name="connsiteX4" fmla="*/ 0 w 4924323"/>
+              <a:gd name="connsiteY4" fmla="*/ 0 h 3649982"/>
+              <a:gd name="connsiteX0" fmla="*/ 0 w 4924323"/>
+              <a:gd name="connsiteY0" fmla="*/ 0 h 3649982"/>
+              <a:gd name="connsiteX1" fmla="*/ 3263302 w 4924323"/>
+              <a:gd name="connsiteY1" fmla="*/ 1115736 h 3649982"/>
+              <a:gd name="connsiteX2" fmla="*/ 4924323 w 4924323"/>
+              <a:gd name="connsiteY2" fmla="*/ 3649982 h 3649982"/>
+              <a:gd name="connsiteX3" fmla="*/ 0 w 4924323"/>
+              <a:gd name="connsiteY3" fmla="*/ 3649982 h 3649982"/>
+              <a:gd name="connsiteX4" fmla="*/ 0 w 4924323"/>
+              <a:gd name="connsiteY4" fmla="*/ 0 h 3649982"/>
+              <a:gd name="connsiteX0" fmla="*/ 0 w 4924323"/>
+              <a:gd name="connsiteY0" fmla="*/ 0 h 3649982"/>
+              <a:gd name="connsiteX1" fmla="*/ 3263302 w 4924323"/>
+              <a:gd name="connsiteY1" fmla="*/ 1115736 h 3649982"/>
+              <a:gd name="connsiteX2" fmla="*/ 4924323 w 4924323"/>
+              <a:gd name="connsiteY2" fmla="*/ 3649982 h 3649982"/>
+              <a:gd name="connsiteX3" fmla="*/ 0 w 4924323"/>
+              <a:gd name="connsiteY3" fmla="*/ 3649982 h 3649982"/>
+              <a:gd name="connsiteX4" fmla="*/ 0 w 4924323"/>
+              <a:gd name="connsiteY4" fmla="*/ 0 h 3649982"/>
+              <a:gd name="connsiteX0" fmla="*/ 0 w 4924323"/>
+              <a:gd name="connsiteY0" fmla="*/ 0 h 3649982"/>
+              <a:gd name="connsiteX1" fmla="*/ 3263302 w 4924323"/>
+              <a:gd name="connsiteY1" fmla="*/ 1115736 h 3649982"/>
+              <a:gd name="connsiteX2" fmla="*/ 4924323 w 4924323"/>
+              <a:gd name="connsiteY2" fmla="*/ 3649982 h 3649982"/>
+              <a:gd name="connsiteX3" fmla="*/ 0 w 4924323"/>
+              <a:gd name="connsiteY3" fmla="*/ 3649982 h 3649982"/>
+              <a:gd name="connsiteX4" fmla="*/ 0 w 4924323"/>
+              <a:gd name="connsiteY4" fmla="*/ 0 h 3649982"/>
+              <a:gd name="connsiteX0" fmla="*/ 0 w 4924323"/>
+              <a:gd name="connsiteY0" fmla="*/ 0 h 3649982"/>
+              <a:gd name="connsiteX1" fmla="*/ 3263302 w 4924323"/>
+              <a:gd name="connsiteY1" fmla="*/ 1115736 h 3649982"/>
+              <a:gd name="connsiteX2" fmla="*/ 4924323 w 4924323"/>
+              <a:gd name="connsiteY2" fmla="*/ 3649982 h 3649982"/>
+              <a:gd name="connsiteX3" fmla="*/ 0 w 4924323"/>
+              <a:gd name="connsiteY3" fmla="*/ 3649982 h 3649982"/>
+              <a:gd name="connsiteX4" fmla="*/ 0 w 4924323"/>
+              <a:gd name="connsiteY4" fmla="*/ 0 h 3649982"/>
+            </a:gdLst>
+            <a:ahLst/>
+            <a:cxnLst>
+              <a:cxn ang="0">
+                <a:pos x="connsiteX0" y="connsiteY0"/>
+              </a:cxn>
+              <a:cxn ang="0">
+                <a:pos x="connsiteX1" y="connsiteY1"/>
+              </a:cxn>
+              <a:cxn ang="0">
+                <a:pos x="connsiteX2" y="connsiteY2"/>
+              </a:cxn>
+              <a:cxn ang="0">
+                <a:pos x="connsiteX3" y="connsiteY3"/>
+              </a:cxn>
+              <a:cxn ang="0">
+                <a:pos x="connsiteX4" y="connsiteY4"/>
+              </a:cxn>
+            </a:cxnLst>
+            <a:rect l="l" t="t" r="r" b="b"/>
+            <a:pathLst>
+              <a:path w="4924323" h="3649982">
+                <a:moveTo>
+                  <a:pt x="0" y="0"/>
+                </a:moveTo>
+                <a:cubicBezTo>
+                  <a:pt x="1138104" y="143883"/>
+                  <a:pt x="2498040" y="438964"/>
+                  <a:pt x="3263302" y="1115736"/>
+                </a:cubicBezTo>
+                <a:cubicBezTo>
+                  <a:pt x="3962385" y="1733982"/>
+                  <a:pt x="4585967" y="2671009"/>
+                  <a:pt x="4924323" y="3649982"/>
+                </a:cubicBezTo>
+                <a:lnTo>
+                  <a:pt x="0" y="3649982"/>
+                </a:lnTo>
+                <a:lnTo>
+                  <a:pt x="0" y="0"/>
+                </a:lnTo>
+                <a:close/>
+              </a:path>
+            </a:pathLst>
+          </a:custGeom>
+          <a:solidFill>
+            <a:schemeClr val="accent5">
+              <a:lumMod val="40000"/>
+              <a:lumOff val="60000"/>
+            </a:schemeClr>
+          </a:solidFill>
+          <a:ln w="12700" cap="flat" cmpd="sng" algn="ctr">
+            <a:noFill/>
+            <a:prstDash val="solid"/>
+            <a:miter lim="800000"/>
+          </a:ln>
+          <a:effectLst/>
+        </p:spPr>
+        <p:txBody>
+          <a:bodyPr rot="0" spcFirstLastPara="0" vertOverflow="overflow" horzOverflow="overflow" vert="horz" wrap="square" lIns="68580" tIns="34290" rIns="68580" bIns="34290" numCol="1" spcCol="0" rtlCol="0" fromWordArt="0" anchor="ctr" anchorCtr="0" forceAA="0" compatLnSpc="1">
+            <a:prstTxWarp prst="textNoShape">
+              <a:avLst/>
+            </a:prstTxWarp>
+            <a:noAutofit/>
+          </a:bodyPr>
+          <a:lstStyle/>
+          <a:p>
+            <a:pPr algn="ctr" defTabSz="457200">
+              <a:defRPr/>
+            </a:pPr>
+            <a:endParaRPr lang="fr-FR" sz="1400" kern="0" dirty="0">
+              <a:solidFill>
+                <a:prstClr val="white"/>
+              </a:solidFill>
+            </a:endParaRPr>
+          </a:p>
+        </p:txBody>
+      </p:sp>
+      <p:sp>
+        <p:nvSpPr>
+          <p:cNvPr id="11" name="Rectangle 16">
+            <a:extLst>
+              <a:ext uri="{FF2B5EF4-FFF2-40B4-BE49-F238E27FC236}">
+                <a16:creationId xmlns:a16="http://schemas.microsoft.com/office/drawing/2014/main" id="{E8D091AD-A09C-4612-9437-A04AC1909E09}"/>
+              </a:ext>
+            </a:extLst>
+          </p:cNvPr>
+          <p:cNvSpPr/>
+          <p:nvPr/>
+        </p:nvSpPr>
+        <p:spPr>
+          <a:xfrm flipH="1">
+            <a:off x="1785034" y="1598424"/>
+            <a:ext cx="2878435" cy="2133539"/>
+          </a:xfrm>
+          <a:custGeom>
+            <a:avLst/>
+            <a:gdLst>
+              <a:gd name="connsiteX0" fmla="*/ 0 w 4924323"/>
+              <a:gd name="connsiteY0" fmla="*/ 0 h 3649982"/>
+              <a:gd name="connsiteX1" fmla="*/ 4924323 w 4924323"/>
+              <a:gd name="connsiteY1" fmla="*/ 0 h 3649982"/>
+              <a:gd name="connsiteX2" fmla="*/ 4924323 w 4924323"/>
+              <a:gd name="connsiteY2" fmla="*/ 3649982 h 3649982"/>
+              <a:gd name="connsiteX3" fmla="*/ 0 w 4924323"/>
+              <a:gd name="connsiteY3" fmla="*/ 3649982 h 3649982"/>
+              <a:gd name="connsiteX4" fmla="*/ 0 w 4924323"/>
+              <a:gd name="connsiteY4" fmla="*/ 0 h 3649982"/>
+              <a:gd name="connsiteX0" fmla="*/ 0 w 4924323"/>
+              <a:gd name="connsiteY0" fmla="*/ 0 h 3649982"/>
+              <a:gd name="connsiteX1" fmla="*/ 2650906 w 4924323"/>
+              <a:gd name="connsiteY1" fmla="*/ 1543574 h 3649982"/>
+              <a:gd name="connsiteX2" fmla="*/ 4924323 w 4924323"/>
+              <a:gd name="connsiteY2" fmla="*/ 3649982 h 3649982"/>
+              <a:gd name="connsiteX3" fmla="*/ 0 w 4924323"/>
+              <a:gd name="connsiteY3" fmla="*/ 3649982 h 3649982"/>
+              <a:gd name="connsiteX4" fmla="*/ 0 w 4924323"/>
+              <a:gd name="connsiteY4" fmla="*/ 0 h 3649982"/>
+              <a:gd name="connsiteX0" fmla="*/ 0 w 4924323"/>
+              <a:gd name="connsiteY0" fmla="*/ 0 h 3649982"/>
+              <a:gd name="connsiteX1" fmla="*/ 2650906 w 4924323"/>
+              <a:gd name="connsiteY1" fmla="*/ 1543574 h 3649982"/>
+              <a:gd name="connsiteX2" fmla="*/ 4924323 w 4924323"/>
+              <a:gd name="connsiteY2" fmla="*/ 3649982 h 3649982"/>
+              <a:gd name="connsiteX3" fmla="*/ 0 w 4924323"/>
+              <a:gd name="connsiteY3" fmla="*/ 3649982 h 3649982"/>
+              <a:gd name="connsiteX4" fmla="*/ 0 w 4924323"/>
+              <a:gd name="connsiteY4" fmla="*/ 0 h 3649982"/>
+              <a:gd name="connsiteX0" fmla="*/ 0 w 4924323"/>
+              <a:gd name="connsiteY0" fmla="*/ 0 h 3649982"/>
+              <a:gd name="connsiteX1" fmla="*/ 2650906 w 4924323"/>
+              <a:gd name="connsiteY1" fmla="*/ 1543574 h 3649982"/>
+              <a:gd name="connsiteX2" fmla="*/ 4924323 w 4924323"/>
+              <a:gd name="connsiteY2" fmla="*/ 3649982 h 3649982"/>
+              <a:gd name="connsiteX3" fmla="*/ 0 w 4924323"/>
+              <a:gd name="connsiteY3" fmla="*/ 3649982 h 3649982"/>
+              <a:gd name="connsiteX4" fmla="*/ 0 w 4924323"/>
+              <a:gd name="connsiteY4" fmla="*/ 0 h 3649982"/>
+              <a:gd name="connsiteX0" fmla="*/ 0 w 4924323"/>
+              <a:gd name="connsiteY0" fmla="*/ 56410 h 3706392"/>
+              <a:gd name="connsiteX1" fmla="*/ 2650906 w 4924323"/>
+              <a:gd name="connsiteY1" fmla="*/ 1599984 h 3706392"/>
+              <a:gd name="connsiteX2" fmla="*/ 4924323 w 4924323"/>
+              <a:gd name="connsiteY2" fmla="*/ 3706392 h 3706392"/>
+              <a:gd name="connsiteX3" fmla="*/ 0 w 4924323"/>
+              <a:gd name="connsiteY3" fmla="*/ 3706392 h 3706392"/>
+              <a:gd name="connsiteX4" fmla="*/ 0 w 4924323"/>
+              <a:gd name="connsiteY4" fmla="*/ 56410 h 3706392"/>
+              <a:gd name="connsiteX0" fmla="*/ 0 w 4924323"/>
+              <a:gd name="connsiteY0" fmla="*/ 63809 h 3713791"/>
+              <a:gd name="connsiteX1" fmla="*/ 2650906 w 4924323"/>
+              <a:gd name="connsiteY1" fmla="*/ 1607383 h 3713791"/>
+              <a:gd name="connsiteX2" fmla="*/ 4924323 w 4924323"/>
+              <a:gd name="connsiteY2" fmla="*/ 3713791 h 3713791"/>
+              <a:gd name="connsiteX3" fmla="*/ 0 w 4924323"/>
+              <a:gd name="connsiteY3" fmla="*/ 3713791 h 3713791"/>
+              <a:gd name="connsiteX4" fmla="*/ 0 w 4924323"/>
+              <a:gd name="connsiteY4" fmla="*/ 63809 h 3713791"/>
+              <a:gd name="connsiteX0" fmla="*/ 0 w 4924323"/>
+              <a:gd name="connsiteY0" fmla="*/ 0 h 3649982"/>
+              <a:gd name="connsiteX1" fmla="*/ 2650906 w 4924323"/>
+              <a:gd name="connsiteY1" fmla="*/ 1543574 h 3649982"/>
+              <a:gd name="connsiteX2" fmla="*/ 4924323 w 4924323"/>
+              <a:gd name="connsiteY2" fmla="*/ 3649982 h 3649982"/>
+              <a:gd name="connsiteX3" fmla="*/ 0 w 4924323"/>
+              <a:gd name="connsiteY3" fmla="*/ 3649982 h 3649982"/>
+              <a:gd name="connsiteX4" fmla="*/ 0 w 4924323"/>
+              <a:gd name="connsiteY4" fmla="*/ 0 h 3649982"/>
+              <a:gd name="connsiteX0" fmla="*/ 0 w 4924323"/>
+              <a:gd name="connsiteY0" fmla="*/ 0 h 3649982"/>
+              <a:gd name="connsiteX1" fmla="*/ 3305247 w 4924323"/>
+              <a:gd name="connsiteY1" fmla="*/ 1333849 h 3649982"/>
+              <a:gd name="connsiteX2" fmla="*/ 4924323 w 4924323"/>
+              <a:gd name="connsiteY2" fmla="*/ 3649982 h 3649982"/>
+              <a:gd name="connsiteX3" fmla="*/ 0 w 4924323"/>
+              <a:gd name="connsiteY3" fmla="*/ 3649982 h 3649982"/>
+              <a:gd name="connsiteX4" fmla="*/ 0 w 4924323"/>
+              <a:gd name="connsiteY4" fmla="*/ 0 h 3649982"/>
+              <a:gd name="connsiteX0" fmla="*/ 0 w 4924323"/>
+              <a:gd name="connsiteY0" fmla="*/ 0 h 3649982"/>
+              <a:gd name="connsiteX1" fmla="*/ 3305247 w 4924323"/>
+              <a:gd name="connsiteY1" fmla="*/ 1333849 h 3649982"/>
+              <a:gd name="connsiteX2" fmla="*/ 4924323 w 4924323"/>
+              <a:gd name="connsiteY2" fmla="*/ 3649982 h 3649982"/>
+              <a:gd name="connsiteX3" fmla="*/ 0 w 4924323"/>
+              <a:gd name="connsiteY3" fmla="*/ 3649982 h 3649982"/>
+              <a:gd name="connsiteX4" fmla="*/ 0 w 4924323"/>
+              <a:gd name="connsiteY4" fmla="*/ 0 h 3649982"/>
+              <a:gd name="connsiteX0" fmla="*/ 0 w 4924323"/>
+              <a:gd name="connsiteY0" fmla="*/ 0 h 3649982"/>
+              <a:gd name="connsiteX1" fmla="*/ 3263302 w 4924323"/>
+              <a:gd name="connsiteY1" fmla="*/ 1115736 h 3649982"/>
+              <a:gd name="connsiteX2" fmla="*/ 4924323 w 4924323"/>
+              <a:gd name="connsiteY2" fmla="*/ 3649982 h 3649982"/>
+              <a:gd name="connsiteX3" fmla="*/ 0 w 4924323"/>
+              <a:gd name="connsiteY3" fmla="*/ 3649982 h 3649982"/>
+              <a:gd name="connsiteX4" fmla="*/ 0 w 4924323"/>
+              <a:gd name="connsiteY4" fmla="*/ 0 h 3649982"/>
+              <a:gd name="connsiteX0" fmla="*/ 0 w 4924323"/>
+              <a:gd name="connsiteY0" fmla="*/ 0 h 3649982"/>
+              <a:gd name="connsiteX1" fmla="*/ 3263302 w 4924323"/>
+              <a:gd name="connsiteY1" fmla="*/ 1115736 h 3649982"/>
+              <a:gd name="connsiteX2" fmla="*/ 4924323 w 4924323"/>
+              <a:gd name="connsiteY2" fmla="*/ 3649982 h 3649982"/>
+              <a:gd name="connsiteX3" fmla="*/ 0 w 4924323"/>
+              <a:gd name="connsiteY3" fmla="*/ 3649982 h 3649982"/>
+              <a:gd name="connsiteX4" fmla="*/ 0 w 4924323"/>
+              <a:gd name="connsiteY4" fmla="*/ 0 h 3649982"/>
+              <a:gd name="connsiteX0" fmla="*/ 0 w 4924323"/>
+              <a:gd name="connsiteY0" fmla="*/ 0 h 3649982"/>
+              <a:gd name="connsiteX1" fmla="*/ 3263302 w 4924323"/>
+              <a:gd name="connsiteY1" fmla="*/ 1115736 h 3649982"/>
+              <a:gd name="connsiteX2" fmla="*/ 4924323 w 4924323"/>
+              <a:gd name="connsiteY2" fmla="*/ 3649982 h 3649982"/>
+              <a:gd name="connsiteX3" fmla="*/ 0 w 4924323"/>
+              <a:gd name="connsiteY3" fmla="*/ 3649982 h 3649982"/>
+              <a:gd name="connsiteX4" fmla="*/ 0 w 4924323"/>
+              <a:gd name="connsiteY4" fmla="*/ 0 h 3649982"/>
+            </a:gdLst>
+            <a:ahLst/>
+            <a:cxnLst>
+              <a:cxn ang="0">
+                <a:pos x="connsiteX0" y="connsiteY0"/>
+              </a:cxn>
+              <a:cxn ang="0">
+                <a:pos x="connsiteX1" y="connsiteY1"/>
+              </a:cxn>
+              <a:cxn ang="0">
+                <a:pos x="connsiteX2" y="connsiteY2"/>
+              </a:cxn>
+              <a:cxn ang="0">
+                <a:pos x="connsiteX3" y="connsiteY3"/>
+              </a:cxn>
+              <a:cxn ang="0">
+                <a:pos x="connsiteX4" y="connsiteY4"/>
+              </a:cxn>
+            </a:cxnLst>
+            <a:rect l="l" t="t" r="r" b="b"/>
+            <a:pathLst>
+              <a:path w="4924323" h="3649982">
+                <a:moveTo>
+                  <a:pt x="0" y="0"/>
+                </a:moveTo>
+                <a:cubicBezTo>
+                  <a:pt x="1138104" y="143883"/>
+                  <a:pt x="2498040" y="438964"/>
+                  <a:pt x="3263302" y="1115736"/>
+                </a:cubicBezTo>
+                <a:cubicBezTo>
+                  <a:pt x="3962385" y="1733982"/>
+                  <a:pt x="4585967" y="2671009"/>
+                  <a:pt x="4924323" y="3649982"/>
+                </a:cubicBezTo>
+                <a:lnTo>
+                  <a:pt x="0" y="3649982"/>
+                </a:lnTo>
+                <a:lnTo>
+                  <a:pt x="0" y="0"/>
+                </a:lnTo>
+                <a:close/>
+              </a:path>
+            </a:pathLst>
+          </a:custGeom>
+          <a:solidFill>
+            <a:schemeClr val="accent5">
+              <a:lumMod val="60000"/>
+              <a:lumOff val="40000"/>
+              <a:alpha val="70000"/>
+            </a:schemeClr>
+          </a:solidFill>
+          <a:ln w="12700" cap="flat" cmpd="sng" algn="ctr">
+            <a:noFill/>
+            <a:prstDash val="solid"/>
+            <a:miter lim="800000"/>
+          </a:ln>
+          <a:effectLst/>
+        </p:spPr>
+        <p:txBody>
+          <a:bodyPr rot="0" spcFirstLastPara="0" vertOverflow="overflow" horzOverflow="overflow" vert="horz" wrap="square" lIns="68580" tIns="34290" rIns="68580" bIns="34290" numCol="1" spcCol="0" rtlCol="0" fromWordArt="0" anchor="ctr" anchorCtr="0" forceAA="0" compatLnSpc="1">
+            <a:prstTxWarp prst="textNoShape">
+              <a:avLst/>
+            </a:prstTxWarp>
+            <a:noAutofit/>
+          </a:bodyPr>
+          <a:lstStyle/>
+          <a:p>
+            <a:pPr algn="ctr" defTabSz="457200">
+              <a:defRPr/>
+            </a:pPr>
+            <a:endParaRPr lang="fr-FR" sz="1400" kern="0" dirty="0">
+              <a:solidFill>
+                <a:prstClr val="white"/>
+              </a:solidFill>
+            </a:endParaRPr>
+          </a:p>
+        </p:txBody>
+      </p:sp>
+      <p:sp>
+        <p:nvSpPr>
+          <p:cNvPr id="12" name="Rectangle 16">
+            <a:extLst>
+              <a:ext uri="{FF2B5EF4-FFF2-40B4-BE49-F238E27FC236}">
+                <a16:creationId xmlns:a16="http://schemas.microsoft.com/office/drawing/2014/main" id="{21B3FBB8-7EF3-4401-B185-7830EF0816E0}"/>
+              </a:ext>
+            </a:extLst>
+          </p:cNvPr>
+          <p:cNvSpPr/>
+          <p:nvPr/>
+        </p:nvSpPr>
+        <p:spPr>
+          <a:xfrm flipH="1">
+            <a:off x="2718770" y="2290522"/>
+            <a:ext cx="1944698" cy="1441440"/>
+          </a:xfrm>
+          <a:custGeom>
+            <a:avLst/>
+            <a:gdLst>
+              <a:gd name="connsiteX0" fmla="*/ 0 w 4924323"/>
+              <a:gd name="connsiteY0" fmla="*/ 0 h 3649982"/>
+              <a:gd name="connsiteX1" fmla="*/ 4924323 w 4924323"/>
+              <a:gd name="connsiteY1" fmla="*/ 0 h 3649982"/>
+              <a:gd name="connsiteX2" fmla="*/ 4924323 w 4924323"/>
+              <a:gd name="connsiteY2" fmla="*/ 3649982 h 3649982"/>
+              <a:gd name="connsiteX3" fmla="*/ 0 w 4924323"/>
+              <a:gd name="connsiteY3" fmla="*/ 3649982 h 3649982"/>
+              <a:gd name="connsiteX4" fmla="*/ 0 w 4924323"/>
+              <a:gd name="connsiteY4" fmla="*/ 0 h 3649982"/>
+              <a:gd name="connsiteX0" fmla="*/ 0 w 4924323"/>
+              <a:gd name="connsiteY0" fmla="*/ 0 h 3649982"/>
+              <a:gd name="connsiteX1" fmla="*/ 2650906 w 4924323"/>
+              <a:gd name="connsiteY1" fmla="*/ 1543574 h 3649982"/>
+              <a:gd name="connsiteX2" fmla="*/ 4924323 w 4924323"/>
+              <a:gd name="connsiteY2" fmla="*/ 3649982 h 3649982"/>
+              <a:gd name="connsiteX3" fmla="*/ 0 w 4924323"/>
+              <a:gd name="connsiteY3" fmla="*/ 3649982 h 3649982"/>
+              <a:gd name="connsiteX4" fmla="*/ 0 w 4924323"/>
+              <a:gd name="connsiteY4" fmla="*/ 0 h 3649982"/>
+              <a:gd name="connsiteX0" fmla="*/ 0 w 4924323"/>
+              <a:gd name="connsiteY0" fmla="*/ 0 h 3649982"/>
+              <a:gd name="connsiteX1" fmla="*/ 2650906 w 4924323"/>
+              <a:gd name="connsiteY1" fmla="*/ 1543574 h 3649982"/>
+              <a:gd name="connsiteX2" fmla="*/ 4924323 w 4924323"/>
+              <a:gd name="connsiteY2" fmla="*/ 3649982 h 3649982"/>
+              <a:gd name="connsiteX3" fmla="*/ 0 w 4924323"/>
+              <a:gd name="connsiteY3" fmla="*/ 3649982 h 3649982"/>
+              <a:gd name="connsiteX4" fmla="*/ 0 w 4924323"/>
+              <a:gd name="connsiteY4" fmla="*/ 0 h 3649982"/>
+              <a:gd name="connsiteX0" fmla="*/ 0 w 4924323"/>
+              <a:gd name="connsiteY0" fmla="*/ 0 h 3649982"/>
+              <a:gd name="connsiteX1" fmla="*/ 2650906 w 4924323"/>
+              <a:gd name="connsiteY1" fmla="*/ 1543574 h 3649982"/>
+              <a:gd name="connsiteX2" fmla="*/ 4924323 w 4924323"/>
+              <a:gd name="connsiteY2" fmla="*/ 3649982 h 3649982"/>
+              <a:gd name="connsiteX3" fmla="*/ 0 w 4924323"/>
+              <a:gd name="connsiteY3" fmla="*/ 3649982 h 3649982"/>
+              <a:gd name="connsiteX4" fmla="*/ 0 w 4924323"/>
+              <a:gd name="connsiteY4" fmla="*/ 0 h 3649982"/>
+              <a:gd name="connsiteX0" fmla="*/ 0 w 4924323"/>
+              <a:gd name="connsiteY0" fmla="*/ 56410 h 3706392"/>
+              <a:gd name="connsiteX1" fmla="*/ 2650906 w 4924323"/>
+              <a:gd name="connsiteY1" fmla="*/ 1599984 h 3706392"/>
+              <a:gd name="connsiteX2" fmla="*/ 4924323 w 4924323"/>
+              <a:gd name="connsiteY2" fmla="*/ 3706392 h 3706392"/>
+              <a:gd name="connsiteX3" fmla="*/ 0 w 4924323"/>
+              <a:gd name="connsiteY3" fmla="*/ 3706392 h 3706392"/>
+              <a:gd name="connsiteX4" fmla="*/ 0 w 4924323"/>
+              <a:gd name="connsiteY4" fmla="*/ 56410 h 3706392"/>
+              <a:gd name="connsiteX0" fmla="*/ 0 w 4924323"/>
+              <a:gd name="connsiteY0" fmla="*/ 63809 h 3713791"/>
+              <a:gd name="connsiteX1" fmla="*/ 2650906 w 4924323"/>
+              <a:gd name="connsiteY1" fmla="*/ 1607383 h 3713791"/>
+              <a:gd name="connsiteX2" fmla="*/ 4924323 w 4924323"/>
+              <a:gd name="connsiteY2" fmla="*/ 3713791 h 3713791"/>
+              <a:gd name="connsiteX3" fmla="*/ 0 w 4924323"/>
+              <a:gd name="connsiteY3" fmla="*/ 3713791 h 3713791"/>
+              <a:gd name="connsiteX4" fmla="*/ 0 w 4924323"/>
+              <a:gd name="connsiteY4" fmla="*/ 63809 h 3713791"/>
+              <a:gd name="connsiteX0" fmla="*/ 0 w 4924323"/>
+              <a:gd name="connsiteY0" fmla="*/ 0 h 3649982"/>
+              <a:gd name="connsiteX1" fmla="*/ 2650906 w 4924323"/>
+              <a:gd name="connsiteY1" fmla="*/ 1543574 h 3649982"/>
+              <a:gd name="connsiteX2" fmla="*/ 4924323 w 4924323"/>
+              <a:gd name="connsiteY2" fmla="*/ 3649982 h 3649982"/>
+              <a:gd name="connsiteX3" fmla="*/ 0 w 4924323"/>
+              <a:gd name="connsiteY3" fmla="*/ 3649982 h 3649982"/>
+              <a:gd name="connsiteX4" fmla="*/ 0 w 4924323"/>
+              <a:gd name="connsiteY4" fmla="*/ 0 h 3649982"/>
+              <a:gd name="connsiteX0" fmla="*/ 0 w 4924323"/>
+              <a:gd name="connsiteY0" fmla="*/ 0 h 3649982"/>
+              <a:gd name="connsiteX1" fmla="*/ 3305247 w 4924323"/>
+              <a:gd name="connsiteY1" fmla="*/ 1333849 h 3649982"/>
+              <a:gd name="connsiteX2" fmla="*/ 4924323 w 4924323"/>
+              <a:gd name="connsiteY2" fmla="*/ 3649982 h 3649982"/>
+              <a:gd name="connsiteX3" fmla="*/ 0 w 4924323"/>
+              <a:gd name="connsiteY3" fmla="*/ 3649982 h 3649982"/>
+              <a:gd name="connsiteX4" fmla="*/ 0 w 4924323"/>
+              <a:gd name="connsiteY4" fmla="*/ 0 h 3649982"/>
+              <a:gd name="connsiteX0" fmla="*/ 0 w 4924323"/>
+              <a:gd name="connsiteY0" fmla="*/ 0 h 3649982"/>
+              <a:gd name="connsiteX1" fmla="*/ 3305247 w 4924323"/>
+              <a:gd name="connsiteY1" fmla="*/ 1333849 h 3649982"/>
+              <a:gd name="connsiteX2" fmla="*/ 4924323 w 4924323"/>
+              <a:gd name="connsiteY2" fmla="*/ 3649982 h 3649982"/>
+              <a:gd name="connsiteX3" fmla="*/ 0 w 4924323"/>
+              <a:gd name="connsiteY3" fmla="*/ 3649982 h 3649982"/>
+              <a:gd name="connsiteX4" fmla="*/ 0 w 4924323"/>
+              <a:gd name="connsiteY4" fmla="*/ 0 h 3649982"/>
+              <a:gd name="connsiteX0" fmla="*/ 0 w 4924323"/>
+              <a:gd name="connsiteY0" fmla="*/ 0 h 3649982"/>
+              <a:gd name="connsiteX1" fmla="*/ 3263302 w 4924323"/>
+              <a:gd name="connsiteY1" fmla="*/ 1115736 h 3649982"/>
+              <a:gd name="connsiteX2" fmla="*/ 4924323 w 4924323"/>
+              <a:gd name="connsiteY2" fmla="*/ 3649982 h 3649982"/>
+              <a:gd name="connsiteX3" fmla="*/ 0 w 4924323"/>
+              <a:gd name="connsiteY3" fmla="*/ 3649982 h 3649982"/>
+              <a:gd name="connsiteX4" fmla="*/ 0 w 4924323"/>
+              <a:gd name="connsiteY4" fmla="*/ 0 h 3649982"/>
+              <a:gd name="connsiteX0" fmla="*/ 0 w 4924323"/>
+              <a:gd name="connsiteY0" fmla="*/ 0 h 3649982"/>
+              <a:gd name="connsiteX1" fmla="*/ 3263302 w 4924323"/>
+              <a:gd name="connsiteY1" fmla="*/ 1115736 h 3649982"/>
+              <a:gd name="connsiteX2" fmla="*/ 4924323 w 4924323"/>
+              <a:gd name="connsiteY2" fmla="*/ 3649982 h 3649982"/>
+              <a:gd name="connsiteX3" fmla="*/ 0 w 4924323"/>
+              <a:gd name="connsiteY3" fmla="*/ 3649982 h 3649982"/>
+              <a:gd name="connsiteX4" fmla="*/ 0 w 4924323"/>
+              <a:gd name="connsiteY4" fmla="*/ 0 h 3649982"/>
+              <a:gd name="connsiteX0" fmla="*/ 0 w 4924323"/>
+              <a:gd name="connsiteY0" fmla="*/ 0 h 3649982"/>
+              <a:gd name="connsiteX1" fmla="*/ 3263302 w 4924323"/>
+              <a:gd name="connsiteY1" fmla="*/ 1115736 h 3649982"/>
+              <a:gd name="connsiteX2" fmla="*/ 4924323 w 4924323"/>
+              <a:gd name="connsiteY2" fmla="*/ 3649982 h 3649982"/>
+              <a:gd name="connsiteX3" fmla="*/ 0 w 4924323"/>
+              <a:gd name="connsiteY3" fmla="*/ 3649982 h 3649982"/>
+              <a:gd name="connsiteX4" fmla="*/ 0 w 4924323"/>
+              <a:gd name="connsiteY4" fmla="*/ 0 h 3649982"/>
+            </a:gdLst>
+            <a:ahLst/>
+            <a:cxnLst>
+              <a:cxn ang="0">
+                <a:pos x="connsiteX0" y="connsiteY0"/>
+              </a:cxn>
+              <a:cxn ang="0">
+                <a:pos x="connsiteX1" y="connsiteY1"/>
+              </a:cxn>
+              <a:cxn ang="0">
+                <a:pos x="connsiteX2" y="connsiteY2"/>
+              </a:cxn>
+              <a:cxn ang="0">
+                <a:pos x="connsiteX3" y="connsiteY3"/>
+              </a:cxn>
+              <a:cxn ang="0">
+                <a:pos x="connsiteX4" y="connsiteY4"/>
+              </a:cxn>
+            </a:cxnLst>
+            <a:rect l="l" t="t" r="r" b="b"/>
+            <a:pathLst>
+              <a:path w="4924323" h="3649982">
+                <a:moveTo>
+                  <a:pt x="0" y="0"/>
+                </a:moveTo>
+                <a:cubicBezTo>
+                  <a:pt x="1138104" y="143883"/>
+                  <a:pt x="2498040" y="438964"/>
+                  <a:pt x="3263302" y="1115736"/>
+                </a:cubicBezTo>
+                <a:cubicBezTo>
+                  <a:pt x="3962385" y="1733982"/>
+                  <a:pt x="4585967" y="2671009"/>
+                  <a:pt x="4924323" y="3649982"/>
+                </a:cubicBezTo>
+                <a:lnTo>
+                  <a:pt x="0" y="3649982"/>
+                </a:lnTo>
+                <a:lnTo>
+                  <a:pt x="0" y="0"/>
+                </a:lnTo>
+                <a:close/>
+              </a:path>
+            </a:pathLst>
+          </a:custGeom>
+          <a:solidFill>
+            <a:schemeClr val="accent5">
+              <a:lumMod val="75000"/>
+              <a:alpha val="20000"/>
+            </a:schemeClr>
+          </a:solidFill>
+          <a:ln w="12700" cap="flat" cmpd="sng" algn="ctr">
+            <a:noFill/>
+            <a:prstDash val="solid"/>
+            <a:miter lim="800000"/>
+          </a:ln>
+          <a:effectLst/>
+        </p:spPr>
+        <p:txBody>
+          <a:bodyPr rot="0" spcFirstLastPara="0" vertOverflow="overflow" horzOverflow="overflow" vert="horz" wrap="square" lIns="68580" tIns="34290" rIns="68580" bIns="34290" numCol="1" spcCol="0" rtlCol="0" fromWordArt="0" anchor="ctr" anchorCtr="0" forceAA="0" compatLnSpc="1">
+            <a:prstTxWarp prst="textNoShape">
+              <a:avLst/>
+            </a:prstTxWarp>
+            <a:noAutofit/>
+          </a:bodyPr>
+          <a:lstStyle/>
+          <a:p>
+            <a:pPr algn="ctr" defTabSz="457200">
+              <a:defRPr/>
+            </a:pPr>
+            <a:endParaRPr lang="fr-FR" sz="1400" kern="0" dirty="0">
+              <a:solidFill>
+                <a:prstClr val="white"/>
+              </a:solidFill>
+            </a:endParaRPr>
+          </a:p>
+        </p:txBody>
+      </p:sp>
+      <p:sp>
+        <p:nvSpPr>
+          <p:cNvPr id="13" name="Rectangle 16">
+            <a:extLst>
+              <a:ext uri="{FF2B5EF4-FFF2-40B4-BE49-F238E27FC236}">
+                <a16:creationId xmlns:a16="http://schemas.microsoft.com/office/drawing/2014/main" id="{B567E382-841D-4ADA-9359-737AB259F13D}"/>
+              </a:ext>
+            </a:extLst>
+          </p:cNvPr>
+          <p:cNvSpPr/>
+          <p:nvPr/>
+        </p:nvSpPr>
+        <p:spPr>
+          <a:xfrm flipH="1">
+            <a:off x="3530932" y="2869397"/>
+            <a:ext cx="1132539" cy="862565"/>
+          </a:xfrm>
+          <a:custGeom>
+            <a:avLst/>
+            <a:gdLst>
+              <a:gd name="connsiteX0" fmla="*/ 0 w 4924323"/>
+              <a:gd name="connsiteY0" fmla="*/ 0 h 3649982"/>
+              <a:gd name="connsiteX1" fmla="*/ 4924323 w 4924323"/>
+              <a:gd name="connsiteY1" fmla="*/ 0 h 3649982"/>
+              <a:gd name="connsiteX2" fmla="*/ 4924323 w 4924323"/>
+              <a:gd name="connsiteY2" fmla="*/ 3649982 h 3649982"/>
+              <a:gd name="connsiteX3" fmla="*/ 0 w 4924323"/>
+              <a:gd name="connsiteY3" fmla="*/ 3649982 h 3649982"/>
+              <a:gd name="connsiteX4" fmla="*/ 0 w 4924323"/>
+              <a:gd name="connsiteY4" fmla="*/ 0 h 3649982"/>
+              <a:gd name="connsiteX0" fmla="*/ 0 w 4924323"/>
+              <a:gd name="connsiteY0" fmla="*/ 0 h 3649982"/>
+              <a:gd name="connsiteX1" fmla="*/ 2650906 w 4924323"/>
+              <a:gd name="connsiteY1" fmla="*/ 1543574 h 3649982"/>
+              <a:gd name="connsiteX2" fmla="*/ 4924323 w 4924323"/>
+              <a:gd name="connsiteY2" fmla="*/ 3649982 h 3649982"/>
+              <a:gd name="connsiteX3" fmla="*/ 0 w 4924323"/>
+              <a:gd name="connsiteY3" fmla="*/ 3649982 h 3649982"/>
+              <a:gd name="connsiteX4" fmla="*/ 0 w 4924323"/>
+              <a:gd name="connsiteY4" fmla="*/ 0 h 3649982"/>
+              <a:gd name="connsiteX0" fmla="*/ 0 w 4924323"/>
+              <a:gd name="connsiteY0" fmla="*/ 0 h 3649982"/>
+              <a:gd name="connsiteX1" fmla="*/ 2650906 w 4924323"/>
+              <a:gd name="connsiteY1" fmla="*/ 1543574 h 3649982"/>
+              <a:gd name="connsiteX2" fmla="*/ 4924323 w 4924323"/>
+              <a:gd name="connsiteY2" fmla="*/ 3649982 h 3649982"/>
+              <a:gd name="connsiteX3" fmla="*/ 0 w 4924323"/>
+              <a:gd name="connsiteY3" fmla="*/ 3649982 h 3649982"/>
+              <a:gd name="connsiteX4" fmla="*/ 0 w 4924323"/>
+              <a:gd name="connsiteY4" fmla="*/ 0 h 3649982"/>
+              <a:gd name="connsiteX0" fmla="*/ 0 w 4924323"/>
+              <a:gd name="connsiteY0" fmla="*/ 0 h 3649982"/>
+              <a:gd name="connsiteX1" fmla="*/ 2650906 w 4924323"/>
+              <a:gd name="connsiteY1" fmla="*/ 1543574 h 3649982"/>
+              <a:gd name="connsiteX2" fmla="*/ 4924323 w 4924323"/>
+              <a:gd name="connsiteY2" fmla="*/ 3649982 h 3649982"/>
+              <a:gd name="connsiteX3" fmla="*/ 0 w 4924323"/>
+              <a:gd name="connsiteY3" fmla="*/ 3649982 h 3649982"/>
+              <a:gd name="connsiteX4" fmla="*/ 0 w 4924323"/>
+              <a:gd name="connsiteY4" fmla="*/ 0 h 3649982"/>
+              <a:gd name="connsiteX0" fmla="*/ 0 w 4924323"/>
+              <a:gd name="connsiteY0" fmla="*/ 56410 h 3706392"/>
+              <a:gd name="connsiteX1" fmla="*/ 2650906 w 4924323"/>
+              <a:gd name="connsiteY1" fmla="*/ 1599984 h 3706392"/>
+              <a:gd name="connsiteX2" fmla="*/ 4924323 w 4924323"/>
+              <a:gd name="connsiteY2" fmla="*/ 3706392 h 3706392"/>
+              <a:gd name="connsiteX3" fmla="*/ 0 w 4924323"/>
+              <a:gd name="connsiteY3" fmla="*/ 3706392 h 3706392"/>
+              <a:gd name="connsiteX4" fmla="*/ 0 w 4924323"/>
+              <a:gd name="connsiteY4" fmla="*/ 56410 h 3706392"/>
+              <a:gd name="connsiteX0" fmla="*/ 0 w 4924323"/>
+              <a:gd name="connsiteY0" fmla="*/ 63809 h 3713791"/>
+              <a:gd name="connsiteX1" fmla="*/ 2650906 w 4924323"/>
+              <a:gd name="connsiteY1" fmla="*/ 1607383 h 3713791"/>
+              <a:gd name="connsiteX2" fmla="*/ 4924323 w 4924323"/>
+              <a:gd name="connsiteY2" fmla="*/ 3713791 h 3713791"/>
+              <a:gd name="connsiteX3" fmla="*/ 0 w 4924323"/>
+              <a:gd name="connsiteY3" fmla="*/ 3713791 h 3713791"/>
+              <a:gd name="connsiteX4" fmla="*/ 0 w 4924323"/>
+              <a:gd name="connsiteY4" fmla="*/ 63809 h 3713791"/>
+              <a:gd name="connsiteX0" fmla="*/ 0 w 4924323"/>
+              <a:gd name="connsiteY0" fmla="*/ 0 h 3649982"/>
+              <a:gd name="connsiteX1" fmla="*/ 2650906 w 4924323"/>
+              <a:gd name="connsiteY1" fmla="*/ 1543574 h 3649982"/>
+              <a:gd name="connsiteX2" fmla="*/ 4924323 w 4924323"/>
+              <a:gd name="connsiteY2" fmla="*/ 3649982 h 3649982"/>
+              <a:gd name="connsiteX3" fmla="*/ 0 w 4924323"/>
+              <a:gd name="connsiteY3" fmla="*/ 3649982 h 3649982"/>
+              <a:gd name="connsiteX4" fmla="*/ 0 w 4924323"/>
+              <a:gd name="connsiteY4" fmla="*/ 0 h 3649982"/>
+              <a:gd name="connsiteX0" fmla="*/ 0 w 4924323"/>
+              <a:gd name="connsiteY0" fmla="*/ 0 h 3649982"/>
+              <a:gd name="connsiteX1" fmla="*/ 3305247 w 4924323"/>
+              <a:gd name="connsiteY1" fmla="*/ 1333849 h 3649982"/>
+              <a:gd name="connsiteX2" fmla="*/ 4924323 w 4924323"/>
+              <a:gd name="connsiteY2" fmla="*/ 3649982 h 3649982"/>
+              <a:gd name="connsiteX3" fmla="*/ 0 w 4924323"/>
+              <a:gd name="connsiteY3" fmla="*/ 3649982 h 3649982"/>
+              <a:gd name="connsiteX4" fmla="*/ 0 w 4924323"/>
+              <a:gd name="connsiteY4" fmla="*/ 0 h 3649982"/>
+              <a:gd name="connsiteX0" fmla="*/ 0 w 4924323"/>
+              <a:gd name="connsiteY0" fmla="*/ 0 h 3649982"/>
+              <a:gd name="connsiteX1" fmla="*/ 3305247 w 4924323"/>
+              <a:gd name="connsiteY1" fmla="*/ 1333849 h 3649982"/>
+              <a:gd name="connsiteX2" fmla="*/ 4924323 w 4924323"/>
+              <a:gd name="connsiteY2" fmla="*/ 3649982 h 3649982"/>
+              <a:gd name="connsiteX3" fmla="*/ 0 w 4924323"/>
+              <a:gd name="connsiteY3" fmla="*/ 3649982 h 3649982"/>
+              <a:gd name="connsiteX4" fmla="*/ 0 w 4924323"/>
+              <a:gd name="connsiteY4" fmla="*/ 0 h 3649982"/>
+              <a:gd name="connsiteX0" fmla="*/ 0 w 4924323"/>
+              <a:gd name="connsiteY0" fmla="*/ 0 h 3649982"/>
+              <a:gd name="connsiteX1" fmla="*/ 3263302 w 4924323"/>
+              <a:gd name="connsiteY1" fmla="*/ 1115736 h 3649982"/>
+              <a:gd name="connsiteX2" fmla="*/ 4924323 w 4924323"/>
+              <a:gd name="connsiteY2" fmla="*/ 3649982 h 3649982"/>
+              <a:gd name="connsiteX3" fmla="*/ 0 w 4924323"/>
+              <a:gd name="connsiteY3" fmla="*/ 3649982 h 3649982"/>
+              <a:gd name="connsiteX4" fmla="*/ 0 w 4924323"/>
+              <a:gd name="connsiteY4" fmla="*/ 0 h 3649982"/>
+              <a:gd name="connsiteX0" fmla="*/ 0 w 4924323"/>
+              <a:gd name="connsiteY0" fmla="*/ 0 h 3649982"/>
+              <a:gd name="connsiteX1" fmla="*/ 3263302 w 4924323"/>
+              <a:gd name="connsiteY1" fmla="*/ 1115736 h 3649982"/>
+              <a:gd name="connsiteX2" fmla="*/ 4924323 w 4924323"/>
+              <a:gd name="connsiteY2" fmla="*/ 3649982 h 3649982"/>
+              <a:gd name="connsiteX3" fmla="*/ 0 w 4924323"/>
+              <a:gd name="connsiteY3" fmla="*/ 3649982 h 3649982"/>
+              <a:gd name="connsiteX4" fmla="*/ 0 w 4924323"/>
+              <a:gd name="connsiteY4" fmla="*/ 0 h 3649982"/>
+              <a:gd name="connsiteX0" fmla="*/ 0 w 4924323"/>
+              <a:gd name="connsiteY0" fmla="*/ 0 h 3649982"/>
+              <a:gd name="connsiteX1" fmla="*/ 3263302 w 4924323"/>
+              <a:gd name="connsiteY1" fmla="*/ 1115736 h 3649982"/>
+              <a:gd name="connsiteX2" fmla="*/ 4924323 w 4924323"/>
+              <a:gd name="connsiteY2" fmla="*/ 3649982 h 3649982"/>
+              <a:gd name="connsiteX3" fmla="*/ 0 w 4924323"/>
+              <a:gd name="connsiteY3" fmla="*/ 3649982 h 3649982"/>
+              <a:gd name="connsiteX4" fmla="*/ 0 w 4924323"/>
+              <a:gd name="connsiteY4" fmla="*/ 0 h 3649982"/>
+            </a:gdLst>
+            <a:ahLst/>
+            <a:cxnLst>
+              <a:cxn ang="0">
+                <a:pos x="connsiteX0" y="connsiteY0"/>
+              </a:cxn>
+              <a:cxn ang="0">
+                <a:pos x="connsiteX1" y="connsiteY1"/>
+              </a:cxn>
+              <a:cxn ang="0">
+                <a:pos x="connsiteX2" y="connsiteY2"/>
+              </a:cxn>
+              <a:cxn ang="0">
+                <a:pos x="connsiteX3" y="connsiteY3"/>
+              </a:cxn>
+              <a:cxn ang="0">
+                <a:pos x="connsiteX4" y="connsiteY4"/>
+              </a:cxn>
+            </a:cxnLst>
+            <a:rect l="l" t="t" r="r" b="b"/>
+            <a:pathLst>
+              <a:path w="4924323" h="3649982">
+                <a:moveTo>
+                  <a:pt x="0" y="0"/>
+                </a:moveTo>
+                <a:cubicBezTo>
+                  <a:pt x="1138104" y="143883"/>
+                  <a:pt x="2498040" y="438964"/>
+                  <a:pt x="3263302" y="1115736"/>
+                </a:cubicBezTo>
+                <a:cubicBezTo>
+                  <a:pt x="3962385" y="1733982"/>
+                  <a:pt x="4585967" y="2671009"/>
+                  <a:pt x="4924323" y="3649982"/>
+                </a:cubicBezTo>
+                <a:lnTo>
+                  <a:pt x="0" y="3649982"/>
+                </a:lnTo>
+                <a:lnTo>
+                  <a:pt x="0" y="0"/>
+                </a:lnTo>
+                <a:close/>
+              </a:path>
+            </a:pathLst>
+          </a:custGeom>
+          <a:solidFill>
+            <a:schemeClr val="accent5">
+              <a:lumMod val="50000"/>
+              <a:alpha val="20000"/>
+            </a:schemeClr>
+          </a:solidFill>
+          <a:ln w="12700" cap="flat" cmpd="sng" algn="ctr">
+            <a:noFill/>
+            <a:prstDash val="solid"/>
+            <a:miter lim="800000"/>
+          </a:ln>
+          <a:effectLst/>
+        </p:spPr>
+        <p:txBody>
+          <a:bodyPr rot="0" spcFirstLastPara="0" vertOverflow="overflow" horzOverflow="overflow" vert="horz" wrap="square" lIns="68580" tIns="34290" rIns="68580" bIns="34290" numCol="1" spcCol="0" rtlCol="0" fromWordArt="0" anchor="ctr" anchorCtr="0" forceAA="0" compatLnSpc="1">
+            <a:prstTxWarp prst="textNoShape">
+              <a:avLst/>
+            </a:prstTxWarp>
+            <a:noAutofit/>
+          </a:bodyPr>
+          <a:lstStyle/>
+          <a:p>
+            <a:pPr algn="ctr" defTabSz="457200">
+              <a:defRPr/>
+            </a:pPr>
+            <a:endParaRPr lang="fr-FR" sz="1400" kern="0" dirty="0">
+              <a:solidFill>
+                <a:schemeClr val="accent5">
+                  <a:lumMod val="75000"/>
+                </a:schemeClr>
+              </a:solidFill>
+            </a:endParaRPr>
+          </a:p>
+        </p:txBody>
+      </p:sp>
+      <p:sp>
+        <p:nvSpPr>
+          <p:cNvPr id="3" name="Rectangle 16">
+            <a:extLst>
+              <a:ext uri="{FF2B5EF4-FFF2-40B4-BE49-F238E27FC236}">
+                <a16:creationId xmlns:a16="http://schemas.microsoft.com/office/drawing/2014/main" id="{36C6ED9A-C0FC-42C8-8A69-25987C7899A4}"/>
+              </a:ext>
+            </a:extLst>
+          </p:cNvPr>
+          <p:cNvSpPr/>
+          <p:nvPr/>
+        </p:nvSpPr>
+        <p:spPr>
+          <a:xfrm flipH="1">
+            <a:off x="2200010" y="994388"/>
+            <a:ext cx="2462226" cy="2738107"/>
+          </a:xfrm>
+          <a:custGeom>
+            <a:avLst/>
+            <a:gdLst>
+              <a:gd name="connsiteX0" fmla="*/ 0 w 4924323"/>
+              <a:gd name="connsiteY0" fmla="*/ 0 h 3649982"/>
+              <a:gd name="connsiteX1" fmla="*/ 4924323 w 4924323"/>
+              <a:gd name="connsiteY1" fmla="*/ 0 h 3649982"/>
+              <a:gd name="connsiteX2" fmla="*/ 4924323 w 4924323"/>
+              <a:gd name="connsiteY2" fmla="*/ 3649982 h 3649982"/>
+              <a:gd name="connsiteX3" fmla="*/ 0 w 4924323"/>
+              <a:gd name="connsiteY3" fmla="*/ 3649982 h 3649982"/>
+              <a:gd name="connsiteX4" fmla="*/ 0 w 4924323"/>
+              <a:gd name="connsiteY4" fmla="*/ 0 h 3649982"/>
+              <a:gd name="connsiteX0" fmla="*/ 0 w 4924323"/>
+              <a:gd name="connsiteY0" fmla="*/ 0 h 3649982"/>
+              <a:gd name="connsiteX1" fmla="*/ 2650906 w 4924323"/>
+              <a:gd name="connsiteY1" fmla="*/ 1543574 h 3649982"/>
+              <a:gd name="connsiteX2" fmla="*/ 4924323 w 4924323"/>
+              <a:gd name="connsiteY2" fmla="*/ 3649982 h 3649982"/>
+              <a:gd name="connsiteX3" fmla="*/ 0 w 4924323"/>
+              <a:gd name="connsiteY3" fmla="*/ 3649982 h 3649982"/>
+              <a:gd name="connsiteX4" fmla="*/ 0 w 4924323"/>
+              <a:gd name="connsiteY4" fmla="*/ 0 h 3649982"/>
+              <a:gd name="connsiteX0" fmla="*/ 0 w 4924323"/>
+              <a:gd name="connsiteY0" fmla="*/ 0 h 3649982"/>
+              <a:gd name="connsiteX1" fmla="*/ 2650906 w 4924323"/>
+              <a:gd name="connsiteY1" fmla="*/ 1543574 h 3649982"/>
+              <a:gd name="connsiteX2" fmla="*/ 4924323 w 4924323"/>
+              <a:gd name="connsiteY2" fmla="*/ 3649982 h 3649982"/>
+              <a:gd name="connsiteX3" fmla="*/ 0 w 4924323"/>
+              <a:gd name="connsiteY3" fmla="*/ 3649982 h 3649982"/>
+              <a:gd name="connsiteX4" fmla="*/ 0 w 4924323"/>
+              <a:gd name="connsiteY4" fmla="*/ 0 h 3649982"/>
+              <a:gd name="connsiteX0" fmla="*/ 0 w 4924323"/>
+              <a:gd name="connsiteY0" fmla="*/ 0 h 3649982"/>
+              <a:gd name="connsiteX1" fmla="*/ 2650906 w 4924323"/>
+              <a:gd name="connsiteY1" fmla="*/ 1543574 h 3649982"/>
+              <a:gd name="connsiteX2" fmla="*/ 4924323 w 4924323"/>
+              <a:gd name="connsiteY2" fmla="*/ 3649982 h 3649982"/>
+              <a:gd name="connsiteX3" fmla="*/ 0 w 4924323"/>
+              <a:gd name="connsiteY3" fmla="*/ 3649982 h 3649982"/>
+              <a:gd name="connsiteX4" fmla="*/ 0 w 4924323"/>
+              <a:gd name="connsiteY4" fmla="*/ 0 h 3649982"/>
+              <a:gd name="connsiteX0" fmla="*/ 0 w 4924323"/>
+              <a:gd name="connsiteY0" fmla="*/ 56410 h 3706392"/>
+              <a:gd name="connsiteX1" fmla="*/ 2650906 w 4924323"/>
+              <a:gd name="connsiteY1" fmla="*/ 1599984 h 3706392"/>
+              <a:gd name="connsiteX2" fmla="*/ 4924323 w 4924323"/>
+              <a:gd name="connsiteY2" fmla="*/ 3706392 h 3706392"/>
+              <a:gd name="connsiteX3" fmla="*/ 0 w 4924323"/>
+              <a:gd name="connsiteY3" fmla="*/ 3706392 h 3706392"/>
+              <a:gd name="connsiteX4" fmla="*/ 0 w 4924323"/>
+              <a:gd name="connsiteY4" fmla="*/ 56410 h 3706392"/>
+              <a:gd name="connsiteX0" fmla="*/ 0 w 4924323"/>
+              <a:gd name="connsiteY0" fmla="*/ 63809 h 3713791"/>
+              <a:gd name="connsiteX1" fmla="*/ 2650906 w 4924323"/>
+              <a:gd name="connsiteY1" fmla="*/ 1607383 h 3713791"/>
+              <a:gd name="connsiteX2" fmla="*/ 4924323 w 4924323"/>
+              <a:gd name="connsiteY2" fmla="*/ 3713791 h 3713791"/>
+              <a:gd name="connsiteX3" fmla="*/ 0 w 4924323"/>
+              <a:gd name="connsiteY3" fmla="*/ 3713791 h 3713791"/>
+              <a:gd name="connsiteX4" fmla="*/ 0 w 4924323"/>
+              <a:gd name="connsiteY4" fmla="*/ 63809 h 3713791"/>
+              <a:gd name="connsiteX0" fmla="*/ 0 w 4924323"/>
+              <a:gd name="connsiteY0" fmla="*/ 0 h 3649982"/>
+              <a:gd name="connsiteX1" fmla="*/ 2650906 w 4924323"/>
+              <a:gd name="connsiteY1" fmla="*/ 1543574 h 3649982"/>
+              <a:gd name="connsiteX2" fmla="*/ 4924323 w 4924323"/>
+              <a:gd name="connsiteY2" fmla="*/ 3649982 h 3649982"/>
+              <a:gd name="connsiteX3" fmla="*/ 0 w 4924323"/>
+              <a:gd name="connsiteY3" fmla="*/ 3649982 h 3649982"/>
+              <a:gd name="connsiteX4" fmla="*/ 0 w 4924323"/>
+              <a:gd name="connsiteY4" fmla="*/ 0 h 3649982"/>
+              <a:gd name="connsiteX0" fmla="*/ 0 w 4924323"/>
+              <a:gd name="connsiteY0" fmla="*/ 0 h 3649982"/>
+              <a:gd name="connsiteX1" fmla="*/ 3305247 w 4924323"/>
+              <a:gd name="connsiteY1" fmla="*/ 1333849 h 3649982"/>
+              <a:gd name="connsiteX2" fmla="*/ 4924323 w 4924323"/>
+              <a:gd name="connsiteY2" fmla="*/ 3649982 h 3649982"/>
+              <a:gd name="connsiteX3" fmla="*/ 0 w 4924323"/>
+              <a:gd name="connsiteY3" fmla="*/ 3649982 h 3649982"/>
+              <a:gd name="connsiteX4" fmla="*/ 0 w 4924323"/>
+              <a:gd name="connsiteY4" fmla="*/ 0 h 3649982"/>
+              <a:gd name="connsiteX0" fmla="*/ 0 w 4924323"/>
+              <a:gd name="connsiteY0" fmla="*/ 0 h 3649982"/>
+              <a:gd name="connsiteX1" fmla="*/ 3305247 w 4924323"/>
+              <a:gd name="connsiteY1" fmla="*/ 1333849 h 3649982"/>
+              <a:gd name="connsiteX2" fmla="*/ 4924323 w 4924323"/>
+              <a:gd name="connsiteY2" fmla="*/ 3649982 h 3649982"/>
+              <a:gd name="connsiteX3" fmla="*/ 0 w 4924323"/>
+              <a:gd name="connsiteY3" fmla="*/ 3649982 h 3649982"/>
+              <a:gd name="connsiteX4" fmla="*/ 0 w 4924323"/>
+              <a:gd name="connsiteY4" fmla="*/ 0 h 3649982"/>
+              <a:gd name="connsiteX0" fmla="*/ 0 w 4924323"/>
+              <a:gd name="connsiteY0" fmla="*/ 0 h 3649982"/>
+              <a:gd name="connsiteX1" fmla="*/ 3263302 w 4924323"/>
+              <a:gd name="connsiteY1" fmla="*/ 1115736 h 3649982"/>
+              <a:gd name="connsiteX2" fmla="*/ 4924323 w 4924323"/>
+              <a:gd name="connsiteY2" fmla="*/ 3649982 h 3649982"/>
+              <a:gd name="connsiteX3" fmla="*/ 0 w 4924323"/>
+              <a:gd name="connsiteY3" fmla="*/ 3649982 h 3649982"/>
+              <a:gd name="connsiteX4" fmla="*/ 0 w 4924323"/>
+              <a:gd name="connsiteY4" fmla="*/ 0 h 3649982"/>
+              <a:gd name="connsiteX0" fmla="*/ 0 w 4924323"/>
+              <a:gd name="connsiteY0" fmla="*/ 0 h 3649982"/>
+              <a:gd name="connsiteX1" fmla="*/ 3263302 w 4924323"/>
+              <a:gd name="connsiteY1" fmla="*/ 1115736 h 3649982"/>
+              <a:gd name="connsiteX2" fmla="*/ 4924323 w 4924323"/>
+              <a:gd name="connsiteY2" fmla="*/ 3649982 h 3649982"/>
+              <a:gd name="connsiteX3" fmla="*/ 0 w 4924323"/>
+              <a:gd name="connsiteY3" fmla="*/ 3649982 h 3649982"/>
+              <a:gd name="connsiteX4" fmla="*/ 0 w 4924323"/>
+              <a:gd name="connsiteY4" fmla="*/ 0 h 3649982"/>
+              <a:gd name="connsiteX0" fmla="*/ 0 w 4924323"/>
+              <a:gd name="connsiteY0" fmla="*/ 0 h 3649982"/>
+              <a:gd name="connsiteX1" fmla="*/ 3263302 w 4924323"/>
+              <a:gd name="connsiteY1" fmla="*/ 1115736 h 3649982"/>
+              <a:gd name="connsiteX2" fmla="*/ 4924323 w 4924323"/>
+              <a:gd name="connsiteY2" fmla="*/ 3649982 h 3649982"/>
+              <a:gd name="connsiteX3" fmla="*/ 0 w 4924323"/>
+              <a:gd name="connsiteY3" fmla="*/ 3649982 h 3649982"/>
+              <a:gd name="connsiteX4" fmla="*/ 0 w 4924323"/>
+              <a:gd name="connsiteY4" fmla="*/ 0 h 3649982"/>
+              <a:gd name="connsiteX0" fmla="*/ 0 w 4924323"/>
+              <a:gd name="connsiteY0" fmla="*/ 0 h 3649982"/>
+              <a:gd name="connsiteX1" fmla="*/ 3263302 w 4924323"/>
+              <a:gd name="connsiteY1" fmla="*/ 1115736 h 3649982"/>
+              <a:gd name="connsiteX2" fmla="*/ 4924323 w 4924323"/>
+              <a:gd name="connsiteY2" fmla="*/ 3649982 h 3649982"/>
+              <a:gd name="connsiteX3" fmla="*/ 0 w 4924323"/>
+              <a:gd name="connsiteY3" fmla="*/ 3649982 h 3649982"/>
+              <a:gd name="connsiteX4" fmla="*/ 0 w 4924323"/>
+              <a:gd name="connsiteY4" fmla="*/ 0 h 3649982"/>
+              <a:gd name="connsiteX0" fmla="*/ 0 w 3451087"/>
+              <a:gd name="connsiteY0" fmla="*/ 0 h 3649982"/>
+              <a:gd name="connsiteX1" fmla="*/ 3263302 w 3451087"/>
+              <a:gd name="connsiteY1" fmla="*/ 1115736 h 3649982"/>
+              <a:gd name="connsiteX2" fmla="*/ 3289212 w 3451087"/>
+              <a:gd name="connsiteY2" fmla="*/ 3628468 h 3649982"/>
+              <a:gd name="connsiteX3" fmla="*/ 0 w 3451087"/>
+              <a:gd name="connsiteY3" fmla="*/ 3649982 h 3649982"/>
+              <a:gd name="connsiteX4" fmla="*/ 0 w 3451087"/>
+              <a:gd name="connsiteY4" fmla="*/ 0 h 3649982"/>
+              <a:gd name="connsiteX0" fmla="*/ 0 w 3508617"/>
+              <a:gd name="connsiteY0" fmla="*/ 0 h 3649982"/>
+              <a:gd name="connsiteX1" fmla="*/ 3263302 w 3508617"/>
+              <a:gd name="connsiteY1" fmla="*/ 1115736 h 3649982"/>
+              <a:gd name="connsiteX2" fmla="*/ 3289212 w 3508617"/>
+              <a:gd name="connsiteY2" fmla="*/ 3628468 h 3649982"/>
+              <a:gd name="connsiteX3" fmla="*/ 0 w 3508617"/>
+              <a:gd name="connsiteY3" fmla="*/ 3649982 h 3649982"/>
+              <a:gd name="connsiteX4" fmla="*/ 0 w 3508617"/>
+              <a:gd name="connsiteY4" fmla="*/ 0 h 3649982"/>
+              <a:gd name="connsiteX0" fmla="*/ 0 w 3508617"/>
+              <a:gd name="connsiteY0" fmla="*/ 0 h 3649982"/>
+              <a:gd name="connsiteX1" fmla="*/ 3263302 w 3508617"/>
+              <a:gd name="connsiteY1" fmla="*/ 1115736 h 3649982"/>
+              <a:gd name="connsiteX2" fmla="*/ 3289212 w 3508617"/>
+              <a:gd name="connsiteY2" fmla="*/ 3628468 h 3649982"/>
+              <a:gd name="connsiteX3" fmla="*/ 0 w 3508617"/>
+              <a:gd name="connsiteY3" fmla="*/ 3649982 h 3649982"/>
+              <a:gd name="connsiteX4" fmla="*/ 0 w 3508617"/>
+              <a:gd name="connsiteY4" fmla="*/ 0 h 3649982"/>
+              <a:gd name="connsiteX0" fmla="*/ 0 w 3289212"/>
+              <a:gd name="connsiteY0" fmla="*/ 0 h 3649982"/>
+              <a:gd name="connsiteX1" fmla="*/ 3263302 w 3289212"/>
+              <a:gd name="connsiteY1" fmla="*/ 1115736 h 3649982"/>
+              <a:gd name="connsiteX2" fmla="*/ 3289212 w 3289212"/>
+              <a:gd name="connsiteY2" fmla="*/ 3628468 h 3649982"/>
+              <a:gd name="connsiteX3" fmla="*/ 0 w 3289212"/>
+              <a:gd name="connsiteY3" fmla="*/ 3649982 h 3649982"/>
+              <a:gd name="connsiteX4" fmla="*/ 0 w 3289212"/>
+              <a:gd name="connsiteY4" fmla="*/ 0 h 3649982"/>
+              <a:gd name="connsiteX0" fmla="*/ 0 w 3286037"/>
+              <a:gd name="connsiteY0" fmla="*/ 0 h 3649982"/>
+              <a:gd name="connsiteX1" fmla="*/ 3263302 w 3286037"/>
+              <a:gd name="connsiteY1" fmla="*/ 1115736 h 3649982"/>
+              <a:gd name="connsiteX2" fmla="*/ 3286037 w 3286037"/>
+              <a:gd name="connsiteY2" fmla="*/ 3641168 h 3649982"/>
+              <a:gd name="connsiteX3" fmla="*/ 0 w 3286037"/>
+              <a:gd name="connsiteY3" fmla="*/ 3649982 h 3649982"/>
+              <a:gd name="connsiteX4" fmla="*/ 0 w 3286037"/>
+              <a:gd name="connsiteY4" fmla="*/ 0 h 3649982"/>
+              <a:gd name="connsiteX0" fmla="*/ 0 w 3282862"/>
+              <a:gd name="connsiteY0" fmla="*/ 0 h 3650693"/>
+              <a:gd name="connsiteX1" fmla="*/ 3263302 w 3282862"/>
+              <a:gd name="connsiteY1" fmla="*/ 1115736 h 3650693"/>
+              <a:gd name="connsiteX2" fmla="*/ 3282862 w 3282862"/>
+              <a:gd name="connsiteY2" fmla="*/ 3650693 h 3650693"/>
+              <a:gd name="connsiteX3" fmla="*/ 0 w 3282862"/>
+              <a:gd name="connsiteY3" fmla="*/ 3649982 h 3650693"/>
+              <a:gd name="connsiteX4" fmla="*/ 0 w 3282862"/>
+              <a:gd name="connsiteY4" fmla="*/ 0 h 3650693"/>
+            </a:gdLst>
+            <a:ahLst/>
+            <a:cxnLst>
+              <a:cxn ang="0">
+                <a:pos x="connsiteX0" y="connsiteY0"/>
+              </a:cxn>
+              <a:cxn ang="0">
+                <a:pos x="connsiteX1" y="connsiteY1"/>
+              </a:cxn>
+              <a:cxn ang="0">
+                <a:pos x="connsiteX2" y="connsiteY2"/>
+              </a:cxn>
+              <a:cxn ang="0">
+                <a:pos x="connsiteX3" y="connsiteY3"/>
+              </a:cxn>
+              <a:cxn ang="0">
+                <a:pos x="connsiteX4" y="connsiteY4"/>
+              </a:cxn>
+            </a:cxnLst>
+            <a:rect l="l" t="t" r="r" b="b"/>
+            <a:pathLst>
+              <a:path w="3282862" h="3650693">
+                <a:moveTo>
+                  <a:pt x="0" y="0"/>
+                </a:moveTo>
+                <a:cubicBezTo>
+                  <a:pt x="1138104" y="143883"/>
+                  <a:pt x="2715100" y="510991"/>
+                  <a:pt x="3263302" y="1115736"/>
+                </a:cubicBezTo>
+                <a:cubicBezTo>
+                  <a:pt x="3287983" y="3592252"/>
+                  <a:pt x="3260054" y="1151354"/>
+                  <a:pt x="3282862" y="3650693"/>
+                </a:cubicBezTo>
+                <a:lnTo>
+                  <a:pt x="0" y="3649982"/>
+                </a:lnTo>
+                <a:lnTo>
+                  <a:pt x="0" y="0"/>
+                </a:lnTo>
+                <a:close/>
+              </a:path>
+            </a:pathLst>
+          </a:custGeom>
+          <a:pattFill prst="wdDnDiag">
+            <a:fgClr>
+              <a:schemeClr val="tx1">
+                <a:lumMod val="95000"/>
+              </a:schemeClr>
+            </a:fgClr>
+            <a:bgClr>
+              <a:schemeClr val="tx1">
+                <a:lumMod val="75000"/>
+              </a:schemeClr>
+            </a:bgClr>
+          </a:pattFill>
+          <a:ln w="12700" cap="flat" cmpd="sng" algn="ctr">
+            <a:noFill/>
+            <a:prstDash val="solid"/>
+            <a:miter lim="800000"/>
+          </a:ln>
+          <a:effectLst/>
+        </p:spPr>
+        <p:txBody>
+          <a:bodyPr rot="0" spcFirstLastPara="0" vertOverflow="overflow" horzOverflow="overflow" vert="horz" wrap="square" lIns="68580" tIns="34290" rIns="68580" bIns="34290" numCol="1" spcCol="0" rtlCol="0" fromWordArt="0" anchor="ctr" anchorCtr="0" forceAA="0" compatLnSpc="1">
+            <a:prstTxWarp prst="textNoShape">
+              <a:avLst/>
+            </a:prstTxWarp>
+            <a:noAutofit/>
+          </a:bodyPr>
+          <a:lstStyle/>
+          <a:p>
+            <a:pPr algn="ctr" defTabSz="457200">
+              <a:defRPr/>
+            </a:pPr>
+            <a:endParaRPr lang="fr-FR" sz="1400" kern="0" dirty="0">
+              <a:solidFill>
+                <a:prstClr val="white"/>
+              </a:solidFill>
+            </a:endParaRPr>
+          </a:p>
+        </p:txBody>
+      </p:sp>
+      <p:sp>
+        <p:nvSpPr>
+          <p:cNvPr id="14" name="Rectangle 16">
+            <a:extLst>
+              <a:ext uri="{FF2B5EF4-FFF2-40B4-BE49-F238E27FC236}">
+                <a16:creationId xmlns:a16="http://schemas.microsoft.com/office/drawing/2014/main" id="{82509789-2E8C-4C3A-965F-3DE0E4E98C65}"/>
+              </a:ext>
+            </a:extLst>
+          </p:cNvPr>
+          <p:cNvSpPr/>
+          <p:nvPr/>
+        </p:nvSpPr>
+        <p:spPr>
+          <a:xfrm flipH="1">
+            <a:off x="970108" y="1810765"/>
+            <a:ext cx="1290426" cy="1921196"/>
+          </a:xfrm>
+          <a:custGeom>
+            <a:avLst/>
+            <a:gdLst>
+              <a:gd name="connsiteX0" fmla="*/ 0 w 4924323"/>
+              <a:gd name="connsiteY0" fmla="*/ 0 h 3649982"/>
+              <a:gd name="connsiteX1" fmla="*/ 4924323 w 4924323"/>
+              <a:gd name="connsiteY1" fmla="*/ 0 h 3649982"/>
+              <a:gd name="connsiteX2" fmla="*/ 4924323 w 4924323"/>
+              <a:gd name="connsiteY2" fmla="*/ 3649982 h 3649982"/>
+              <a:gd name="connsiteX3" fmla="*/ 0 w 4924323"/>
+              <a:gd name="connsiteY3" fmla="*/ 3649982 h 3649982"/>
+              <a:gd name="connsiteX4" fmla="*/ 0 w 4924323"/>
+              <a:gd name="connsiteY4" fmla="*/ 0 h 3649982"/>
+              <a:gd name="connsiteX0" fmla="*/ 0 w 4924323"/>
+              <a:gd name="connsiteY0" fmla="*/ 0 h 3649982"/>
+              <a:gd name="connsiteX1" fmla="*/ 2650906 w 4924323"/>
+              <a:gd name="connsiteY1" fmla="*/ 1543574 h 3649982"/>
+              <a:gd name="connsiteX2" fmla="*/ 4924323 w 4924323"/>
+              <a:gd name="connsiteY2" fmla="*/ 3649982 h 3649982"/>
+              <a:gd name="connsiteX3" fmla="*/ 0 w 4924323"/>
+              <a:gd name="connsiteY3" fmla="*/ 3649982 h 3649982"/>
+              <a:gd name="connsiteX4" fmla="*/ 0 w 4924323"/>
+              <a:gd name="connsiteY4" fmla="*/ 0 h 3649982"/>
+              <a:gd name="connsiteX0" fmla="*/ 0 w 4924323"/>
+              <a:gd name="connsiteY0" fmla="*/ 0 h 3649982"/>
+              <a:gd name="connsiteX1" fmla="*/ 2650906 w 4924323"/>
+              <a:gd name="connsiteY1" fmla="*/ 1543574 h 3649982"/>
+              <a:gd name="connsiteX2" fmla="*/ 4924323 w 4924323"/>
+              <a:gd name="connsiteY2" fmla="*/ 3649982 h 3649982"/>
+              <a:gd name="connsiteX3" fmla="*/ 0 w 4924323"/>
+              <a:gd name="connsiteY3" fmla="*/ 3649982 h 3649982"/>
+              <a:gd name="connsiteX4" fmla="*/ 0 w 4924323"/>
+              <a:gd name="connsiteY4" fmla="*/ 0 h 3649982"/>
+              <a:gd name="connsiteX0" fmla="*/ 0 w 4924323"/>
+              <a:gd name="connsiteY0" fmla="*/ 0 h 3649982"/>
+              <a:gd name="connsiteX1" fmla="*/ 2650906 w 4924323"/>
+              <a:gd name="connsiteY1" fmla="*/ 1543574 h 3649982"/>
+              <a:gd name="connsiteX2" fmla="*/ 4924323 w 4924323"/>
+              <a:gd name="connsiteY2" fmla="*/ 3649982 h 3649982"/>
+              <a:gd name="connsiteX3" fmla="*/ 0 w 4924323"/>
+              <a:gd name="connsiteY3" fmla="*/ 3649982 h 3649982"/>
+              <a:gd name="connsiteX4" fmla="*/ 0 w 4924323"/>
+              <a:gd name="connsiteY4" fmla="*/ 0 h 3649982"/>
+              <a:gd name="connsiteX0" fmla="*/ 0 w 4924323"/>
+              <a:gd name="connsiteY0" fmla="*/ 56410 h 3706392"/>
+              <a:gd name="connsiteX1" fmla="*/ 2650906 w 4924323"/>
+              <a:gd name="connsiteY1" fmla="*/ 1599984 h 3706392"/>
+              <a:gd name="connsiteX2" fmla="*/ 4924323 w 4924323"/>
+              <a:gd name="connsiteY2" fmla="*/ 3706392 h 3706392"/>
+              <a:gd name="connsiteX3" fmla="*/ 0 w 4924323"/>
+              <a:gd name="connsiteY3" fmla="*/ 3706392 h 3706392"/>
+              <a:gd name="connsiteX4" fmla="*/ 0 w 4924323"/>
+              <a:gd name="connsiteY4" fmla="*/ 56410 h 3706392"/>
+              <a:gd name="connsiteX0" fmla="*/ 0 w 4924323"/>
+              <a:gd name="connsiteY0" fmla="*/ 63809 h 3713791"/>
+              <a:gd name="connsiteX1" fmla="*/ 2650906 w 4924323"/>
+              <a:gd name="connsiteY1" fmla="*/ 1607383 h 3713791"/>
+              <a:gd name="connsiteX2" fmla="*/ 4924323 w 4924323"/>
+              <a:gd name="connsiteY2" fmla="*/ 3713791 h 3713791"/>
+              <a:gd name="connsiteX3" fmla="*/ 0 w 4924323"/>
+              <a:gd name="connsiteY3" fmla="*/ 3713791 h 3713791"/>
+              <a:gd name="connsiteX4" fmla="*/ 0 w 4924323"/>
+              <a:gd name="connsiteY4" fmla="*/ 63809 h 3713791"/>
+              <a:gd name="connsiteX0" fmla="*/ 0 w 4924323"/>
+              <a:gd name="connsiteY0" fmla="*/ 0 h 3649982"/>
+              <a:gd name="connsiteX1" fmla="*/ 2650906 w 4924323"/>
+              <a:gd name="connsiteY1" fmla="*/ 1543574 h 3649982"/>
+              <a:gd name="connsiteX2" fmla="*/ 4924323 w 4924323"/>
+              <a:gd name="connsiteY2" fmla="*/ 3649982 h 3649982"/>
+              <a:gd name="connsiteX3" fmla="*/ 0 w 4924323"/>
+              <a:gd name="connsiteY3" fmla="*/ 3649982 h 3649982"/>
+              <a:gd name="connsiteX4" fmla="*/ 0 w 4924323"/>
+              <a:gd name="connsiteY4" fmla="*/ 0 h 3649982"/>
+              <a:gd name="connsiteX0" fmla="*/ 0 w 4924323"/>
+              <a:gd name="connsiteY0" fmla="*/ 0 h 3649982"/>
+              <a:gd name="connsiteX1" fmla="*/ 3305247 w 4924323"/>
+              <a:gd name="connsiteY1" fmla="*/ 1333849 h 3649982"/>
+              <a:gd name="connsiteX2" fmla="*/ 4924323 w 4924323"/>
+              <a:gd name="connsiteY2" fmla="*/ 3649982 h 3649982"/>
+              <a:gd name="connsiteX3" fmla="*/ 0 w 4924323"/>
+              <a:gd name="connsiteY3" fmla="*/ 3649982 h 3649982"/>
+              <a:gd name="connsiteX4" fmla="*/ 0 w 4924323"/>
+              <a:gd name="connsiteY4" fmla="*/ 0 h 3649982"/>
+              <a:gd name="connsiteX0" fmla="*/ 0 w 4924323"/>
+              <a:gd name="connsiteY0" fmla="*/ 0 h 3649982"/>
+              <a:gd name="connsiteX1" fmla="*/ 3305247 w 4924323"/>
+              <a:gd name="connsiteY1" fmla="*/ 1333849 h 3649982"/>
+              <a:gd name="connsiteX2" fmla="*/ 4924323 w 4924323"/>
+              <a:gd name="connsiteY2" fmla="*/ 3649982 h 3649982"/>
+              <a:gd name="connsiteX3" fmla="*/ 0 w 4924323"/>
+              <a:gd name="connsiteY3" fmla="*/ 3649982 h 3649982"/>
+              <a:gd name="connsiteX4" fmla="*/ 0 w 4924323"/>
+              <a:gd name="connsiteY4" fmla="*/ 0 h 3649982"/>
+              <a:gd name="connsiteX0" fmla="*/ 0 w 4924323"/>
+              <a:gd name="connsiteY0" fmla="*/ 0 h 3649982"/>
+              <a:gd name="connsiteX1" fmla="*/ 3263302 w 4924323"/>
+              <a:gd name="connsiteY1" fmla="*/ 1115736 h 3649982"/>
+              <a:gd name="connsiteX2" fmla="*/ 4924323 w 4924323"/>
+              <a:gd name="connsiteY2" fmla="*/ 3649982 h 3649982"/>
+              <a:gd name="connsiteX3" fmla="*/ 0 w 4924323"/>
+              <a:gd name="connsiteY3" fmla="*/ 3649982 h 3649982"/>
+              <a:gd name="connsiteX4" fmla="*/ 0 w 4924323"/>
+              <a:gd name="connsiteY4" fmla="*/ 0 h 3649982"/>
+              <a:gd name="connsiteX0" fmla="*/ 0 w 4924323"/>
+              <a:gd name="connsiteY0" fmla="*/ 0 h 3649982"/>
+              <a:gd name="connsiteX1" fmla="*/ 3263302 w 4924323"/>
+              <a:gd name="connsiteY1" fmla="*/ 1115736 h 3649982"/>
+              <a:gd name="connsiteX2" fmla="*/ 4924323 w 4924323"/>
+              <a:gd name="connsiteY2" fmla="*/ 3649982 h 3649982"/>
+              <a:gd name="connsiteX3" fmla="*/ 0 w 4924323"/>
+              <a:gd name="connsiteY3" fmla="*/ 3649982 h 3649982"/>
+              <a:gd name="connsiteX4" fmla="*/ 0 w 4924323"/>
+              <a:gd name="connsiteY4" fmla="*/ 0 h 3649982"/>
+              <a:gd name="connsiteX0" fmla="*/ 0 w 4924323"/>
+              <a:gd name="connsiteY0" fmla="*/ 0 h 3649982"/>
+              <a:gd name="connsiteX1" fmla="*/ 3263302 w 4924323"/>
+              <a:gd name="connsiteY1" fmla="*/ 1115736 h 3649982"/>
+              <a:gd name="connsiteX2" fmla="*/ 4924323 w 4924323"/>
+              <a:gd name="connsiteY2" fmla="*/ 3649982 h 3649982"/>
+              <a:gd name="connsiteX3" fmla="*/ 0 w 4924323"/>
+              <a:gd name="connsiteY3" fmla="*/ 3649982 h 3649982"/>
+              <a:gd name="connsiteX4" fmla="*/ 0 w 4924323"/>
+              <a:gd name="connsiteY4" fmla="*/ 0 h 3649982"/>
+              <a:gd name="connsiteX0" fmla="*/ 0 w 4924323"/>
+              <a:gd name="connsiteY0" fmla="*/ 0 h 3649982"/>
+              <a:gd name="connsiteX1" fmla="*/ 3263302 w 4924323"/>
+              <a:gd name="connsiteY1" fmla="*/ 1115736 h 3649982"/>
+              <a:gd name="connsiteX2" fmla="*/ 4924323 w 4924323"/>
+              <a:gd name="connsiteY2" fmla="*/ 3649982 h 3649982"/>
+              <a:gd name="connsiteX3" fmla="*/ 0 w 4924323"/>
+              <a:gd name="connsiteY3" fmla="*/ 0 h 3649982"/>
+              <a:gd name="connsiteX0" fmla="*/ 4924323 w 5015763"/>
+              <a:gd name="connsiteY0" fmla="*/ 3649982 h 3741422"/>
+              <a:gd name="connsiteX1" fmla="*/ 0 w 5015763"/>
+              <a:gd name="connsiteY1" fmla="*/ 0 h 3741422"/>
+              <a:gd name="connsiteX2" fmla="*/ 3263302 w 5015763"/>
+              <a:gd name="connsiteY2" fmla="*/ 1115736 h 3741422"/>
+              <a:gd name="connsiteX3" fmla="*/ 5015763 w 5015763"/>
+              <a:gd name="connsiteY3" fmla="*/ 3741422 h 3741422"/>
+              <a:gd name="connsiteX0" fmla="*/ 0 w 5015763"/>
+              <a:gd name="connsiteY0" fmla="*/ 0 h 3741422"/>
+              <a:gd name="connsiteX1" fmla="*/ 3263302 w 5015763"/>
+              <a:gd name="connsiteY1" fmla="*/ 1115736 h 3741422"/>
+              <a:gd name="connsiteX2" fmla="*/ 5015763 w 5015763"/>
+              <a:gd name="connsiteY2" fmla="*/ 3741422 h 3741422"/>
+              <a:gd name="connsiteX0" fmla="*/ 0 w 1752461"/>
+              <a:gd name="connsiteY0" fmla="*/ 0 h 2625686"/>
+              <a:gd name="connsiteX1" fmla="*/ 1752461 w 1752461"/>
+              <a:gd name="connsiteY1" fmla="*/ 2625686 h 2625686"/>
+            </a:gdLst>
+            <a:ahLst/>
+            <a:cxnLst>
+              <a:cxn ang="0">
+                <a:pos x="connsiteX0" y="connsiteY0"/>
+              </a:cxn>
+              <a:cxn ang="0">
+                <a:pos x="connsiteX1" y="connsiteY1"/>
+              </a:cxn>
+            </a:cxnLst>
+            <a:rect l="l" t="t" r="r" b="b"/>
+            <a:pathLst>
+              <a:path w="1752461" h="2625686">
+                <a:moveTo>
+                  <a:pt x="0" y="0"/>
+                </a:moveTo>
+                <a:cubicBezTo>
+                  <a:pt x="699083" y="618246"/>
+                  <a:pt x="1322665" y="1555273"/>
+                  <a:pt x="1752461" y="2625686"/>
+                </a:cubicBezTo>
+              </a:path>
+            </a:pathLst>
+          </a:custGeom>
+          <a:noFill/>
+          <a:ln w="50800" cap="flat" cmpd="sng" algn="ctr">
+            <a:solidFill>
+              <a:srgbClr val="00B0F0"/>
+            </a:solidFill>
+            <a:prstDash val="solid"/>
+            <a:miter lim="800000"/>
+          </a:ln>
+          <a:effectLst/>
+        </p:spPr>
+        <p:txBody>
+          <a:bodyPr rot="0" spcFirstLastPara="0" vertOverflow="overflow" horzOverflow="overflow" vert="horz" wrap="square" lIns="68580" tIns="34290" rIns="68580" bIns="34290" numCol="1" spcCol="0" rtlCol="0" fromWordArt="0" anchor="ctr" anchorCtr="0" forceAA="0" compatLnSpc="1">
+            <a:prstTxWarp prst="textNoShape">
+              <a:avLst/>
+            </a:prstTxWarp>
+            <a:noAutofit/>
+          </a:bodyPr>
+          <a:lstStyle/>
+          <a:p>
+            <a:pPr algn="ctr" defTabSz="457200">
+              <a:defRPr/>
+            </a:pPr>
+            <a:endParaRPr lang="fr-FR" sz="1400" kern="0" dirty="0">
+              <a:solidFill>
+                <a:prstClr val="white"/>
+              </a:solidFill>
+            </a:endParaRPr>
+          </a:p>
+        </p:txBody>
+      </p:sp>
+      <mc:AlternateContent xmlns:mc="http://schemas.openxmlformats.org/markup-compatibility/2006">
+        <mc:Choice xmlns:a14="http://schemas.microsoft.com/office/drawing/2010/main" Requires="a14">
+          <p:sp>
+            <p:nvSpPr>
+              <p:cNvPr id="16" name="ZoneTexte 15">
+                <a:extLst>
+                  <a:ext uri="{FF2B5EF4-FFF2-40B4-BE49-F238E27FC236}">
+                    <a16:creationId xmlns:a16="http://schemas.microsoft.com/office/drawing/2014/main" id="{16D4DA2D-9F4D-45D5-8B63-94ADCA63F73D}"/>
+                  </a:ext>
+                </a:extLst>
+              </p:cNvPr>
+              <p:cNvSpPr txBox="1"/>
+              <p:nvPr/>
+            </p:nvSpPr>
+            <p:spPr>
+              <a:xfrm>
+                <a:off x="1776631" y="1442895"/>
+                <a:ext cx="606787" cy="238848"/>
+              </a:xfrm>
+              <a:prstGeom prst="rect">
+                <a:avLst/>
+              </a:prstGeom>
+              <a:noFill/>
+              <a:ln>
+                <a:noFill/>
+              </a:ln>
+            </p:spPr>
+            <p:txBody>
+              <a:bodyPr wrap="square" rtlCol="0">
+                <a:spAutoFit/>
+              </a:bodyPr>
+              <a:lstStyle/>
+              <a:p>
+                <a:pPr/>
+                <a14:m>
+                  <m:oMathPara xmlns:m="http://schemas.openxmlformats.org/officeDocument/2006/math">
+                    <m:oMathParaPr>
+                      <m:jc m:val="centerGroup"/>
+                    </m:oMathParaPr>
+                    <m:oMath xmlns:m="http://schemas.openxmlformats.org/officeDocument/2006/math">
+                      <m:sSup>
+                        <m:sSupPr>
+                          <m:ctrlPr>
+                            <a:rPr lang="fr-FR" i="1">
+                              <a:latin typeface="Cambria Math" panose="02040503050406030204" pitchFamily="18" charset="0"/>
+                            </a:rPr>
+                          </m:ctrlPr>
+                        </m:sSupPr>
+                        <m:e>
+                          <m:r>
+                            <a:rPr lang="fr-FR" i="1">
+                              <a:latin typeface="Cambria Math" panose="02040503050406030204" pitchFamily="18" charset="0"/>
+                            </a:rPr>
+                            <m:t>𝜋</m:t>
+                          </m:r>
+                        </m:e>
+                        <m:sup>
+                          <m:r>
+                            <a:rPr lang="fr-FR" i="1">
+                              <a:latin typeface="Cambria Math" panose="02040503050406030204" pitchFamily="18" charset="0"/>
+                            </a:rPr>
+                            <m:t>⋆</m:t>
+                          </m:r>
+                        </m:sup>
+                      </m:sSup>
+                    </m:oMath>
+                  </m:oMathPara>
+                </a14:m>
+                <a:endParaRPr lang="fr-FR" dirty="0"/>
+              </a:p>
+            </p:txBody>
+          </p:sp>
+        </mc:Choice>
+        <mc:Fallback>
+          <p:sp>
+            <p:nvSpPr>
+              <p:cNvPr id="16" name="ZoneTexte 15">
+                <a:extLst>
+                  <a:ext uri="{FF2B5EF4-FFF2-40B4-BE49-F238E27FC236}">
+                    <a16:creationId xmlns:a16="http://schemas.microsoft.com/office/drawing/2014/main" id="{16D4DA2D-9F4D-45D5-8B63-94ADCA63F73D}"/>
+                  </a:ext>
+                </a:extLst>
+              </p:cNvPr>
+              <p:cNvSpPr txBox="1">
+                <a:spLocks noRot="1" noChangeAspect="1" noMove="1" noResize="1" noEditPoints="1" noAdjustHandles="1" noChangeArrowheads="1" noChangeShapeType="1" noTextEdit="1"/>
+              </p:cNvSpPr>
+              <p:nvPr/>
+            </p:nvSpPr>
+            <p:spPr>
+              <a:xfrm>
+                <a:off x="1776631" y="1442895"/>
+                <a:ext cx="606787" cy="238848"/>
+              </a:xfrm>
+              <a:prstGeom prst="rect">
+                <a:avLst/>
+              </a:prstGeom>
+              <a:blipFill>
+                <a:blip r:embed="rId2"/>
+                <a:stretch>
+                  <a:fillRect b="-33333"/>
+                </a:stretch>
+              </a:blipFill>
+              <a:ln>
+                <a:noFill/>
+              </a:ln>
+            </p:spPr>
+            <p:txBody>
+              <a:bodyPr/>
+              <a:lstStyle/>
+              <a:p>
+                <a:r>
+                  <a:rPr lang="en-GB">
+                    <a:noFill/>
+                  </a:rPr>
+                  <a:t> </a:t>
+                </a:r>
+              </a:p>
+            </p:txBody>
+          </p:sp>
+        </mc:Fallback>
+      </mc:AlternateContent>
+      <p:cxnSp>
+        <p:nvCxnSpPr>
+          <p:cNvPr id="24" name="Connecteur droit 23">
+            <a:extLst>
+              <a:ext uri="{FF2B5EF4-FFF2-40B4-BE49-F238E27FC236}">
+                <a16:creationId xmlns:a16="http://schemas.microsoft.com/office/drawing/2014/main" id="{0A78595E-B265-4226-9152-7D32E1FB4790}"/>
+              </a:ext>
+            </a:extLst>
+          </p:cNvPr>
+          <p:cNvCxnSpPr>
+            <a:cxnSpLocks/>
+          </p:cNvCxnSpPr>
+          <p:nvPr/>
+        </p:nvCxnSpPr>
+        <p:spPr>
+          <a:xfrm flipV="1">
+            <a:off x="2198776" y="1866454"/>
+            <a:ext cx="0" cy="2109220"/>
+          </a:xfrm>
+          <a:prstGeom prst="line">
+            <a:avLst/>
+          </a:prstGeom>
+          <a:ln w="44450">
+            <a:solidFill>
+              <a:srgbClr val="00B0F0"/>
+            </a:solidFill>
+          </a:ln>
+        </p:spPr>
+        <p:style>
+          <a:lnRef idx="1">
+            <a:schemeClr val="accent5"/>
+          </a:lnRef>
+          <a:fillRef idx="0">
+            <a:schemeClr val="accent5"/>
+          </a:fillRef>
+          <a:effectRef idx="0">
+            <a:schemeClr val="accent5"/>
+          </a:effectRef>
+          <a:fontRef idx="minor">
+            <a:schemeClr val="tx1"/>
+          </a:fontRef>
+        </p:style>
+      </p:cxnSp>
+      <p:sp>
+        <p:nvSpPr>
+          <p:cNvPr id="25" name="Ellipse 24">
+            <a:extLst>
+              <a:ext uri="{FF2B5EF4-FFF2-40B4-BE49-F238E27FC236}">
+                <a16:creationId xmlns:a16="http://schemas.microsoft.com/office/drawing/2014/main" id="{8DE28190-015E-4B6E-AE82-85ABC63B4F6A}"/>
+              </a:ext>
+            </a:extLst>
+          </p:cNvPr>
+          <p:cNvSpPr/>
+          <p:nvPr/>
+        </p:nvSpPr>
+        <p:spPr>
+          <a:xfrm>
+            <a:off x="2126565" y="1794377"/>
+            <a:ext cx="144420" cy="144420"/>
+          </a:xfrm>
+          <a:prstGeom prst="ellipse">
+            <a:avLst/>
+          </a:prstGeom>
+          <a:solidFill>
+            <a:srgbClr val="00B0F0"/>
+          </a:solidFill>
+          <a:ln>
+            <a:noFill/>
+          </a:ln>
+        </p:spPr>
+        <p:style>
+          <a:lnRef idx="0">
+            <a:scrgbClr r="0" g="0" b="0"/>
+          </a:lnRef>
+          <a:fillRef idx="0">
+            <a:scrgbClr r="0" g="0" b="0"/>
+          </a:fillRef>
+          <a:effectRef idx="0">
+            <a:scrgbClr r="0" g="0" b="0"/>
+          </a:effectRef>
+          <a:fontRef idx="minor">
+            <a:schemeClr val="lt1"/>
+          </a:fontRef>
+        </p:style>
+        <p:txBody>
+          <a:bodyPr rtlCol="0" anchor="ctr"/>
+          <a:lstStyle/>
+          <a:p>
+            <a:pPr algn="ctr"/>
+            <a:endParaRPr lang="en-GB"/>
+          </a:p>
+        </p:txBody>
+      </p:sp>
+      <mc:AlternateContent xmlns:mc="http://schemas.openxmlformats.org/markup-compatibility/2006">
+        <mc:Choice xmlns:a14="http://schemas.microsoft.com/office/drawing/2010/main" Requires="a14">
+          <p:sp>
+            <p:nvSpPr>
+              <p:cNvPr id="27" name="ZoneTexte 26">
+                <a:extLst>
+                  <a:ext uri="{FF2B5EF4-FFF2-40B4-BE49-F238E27FC236}">
+                    <a16:creationId xmlns:a16="http://schemas.microsoft.com/office/drawing/2014/main" id="{522A9E6B-E50B-4168-8FB8-225AE15D793D}"/>
+                  </a:ext>
+                </a:extLst>
+              </p:cNvPr>
+              <p:cNvSpPr txBox="1"/>
+              <p:nvPr/>
+            </p:nvSpPr>
+            <p:spPr>
+              <a:xfrm>
+                <a:off x="2030229" y="3950256"/>
+                <a:ext cx="606787" cy="369332"/>
+              </a:xfrm>
+              <a:prstGeom prst="rect">
+                <a:avLst/>
+              </a:prstGeom>
+              <a:noFill/>
+              <a:ln>
+                <a:noFill/>
+              </a:ln>
+            </p:spPr>
+            <p:txBody>
+              <a:bodyPr wrap="square" rtlCol="0">
+                <a:spAutoFit/>
+              </a:bodyPr>
+              <a:lstStyle/>
+              <a:p>
+                <a:pPr/>
+                <a14:m>
+                  <m:oMathPara xmlns:m="http://schemas.openxmlformats.org/officeDocument/2006/math">
+                    <m:oMathParaPr>
+                      <m:jc m:val="centerGroup"/>
+                    </m:oMathParaPr>
+                    <m:oMath xmlns:m="http://schemas.openxmlformats.org/officeDocument/2006/math">
+                      <m:r>
+                        <a:rPr lang="fr-FR" b="0" i="1" smtClean="0">
+                          <a:solidFill>
+                            <a:srgbClr val="00B0F0"/>
+                          </a:solidFill>
+                          <a:latin typeface="Cambria Math" panose="02040503050406030204" pitchFamily="18" charset="0"/>
+                        </a:rPr>
+                        <m:t>𝛽</m:t>
+                      </m:r>
+                    </m:oMath>
+                  </m:oMathPara>
+                </a14:m>
+                <a:endParaRPr lang="fr-FR" dirty="0">
+                  <a:solidFill>
+                    <a:srgbClr val="00B0F0"/>
+                  </a:solidFill>
+                </a:endParaRPr>
+              </a:p>
+            </p:txBody>
+          </p:sp>
+        </mc:Choice>
+        <mc:Fallback>
+          <p:sp>
+            <p:nvSpPr>
+              <p:cNvPr id="27" name="ZoneTexte 26">
+                <a:extLst>
+                  <a:ext uri="{FF2B5EF4-FFF2-40B4-BE49-F238E27FC236}">
+                    <a16:creationId xmlns:a16="http://schemas.microsoft.com/office/drawing/2014/main" id="{522A9E6B-E50B-4168-8FB8-225AE15D793D}"/>
+                  </a:ext>
+                </a:extLst>
+              </p:cNvPr>
+              <p:cNvSpPr txBox="1">
+                <a:spLocks noRot="1" noChangeAspect="1" noMove="1" noResize="1" noEditPoints="1" noAdjustHandles="1" noChangeArrowheads="1" noChangeShapeType="1" noTextEdit="1"/>
+              </p:cNvSpPr>
+              <p:nvPr/>
+            </p:nvSpPr>
+            <p:spPr>
+              <a:xfrm>
+                <a:off x="2030229" y="3950256"/>
+                <a:ext cx="606787" cy="369332"/>
+              </a:xfrm>
+              <a:prstGeom prst="rect">
+                <a:avLst/>
+              </a:prstGeom>
+              <a:blipFill>
+                <a:blip r:embed="rId3"/>
+                <a:stretch>
+                  <a:fillRect b="-13115"/>
+                </a:stretch>
+              </a:blipFill>
+              <a:ln>
+                <a:noFill/>
+              </a:ln>
+            </p:spPr>
+            <p:txBody>
+              <a:bodyPr/>
+              <a:lstStyle/>
+              <a:p>
+                <a:r>
+                  <a:rPr lang="en-GB">
+                    <a:noFill/>
+                  </a:rPr>
+                  <a:t> </a:t>
+                </a:r>
+              </a:p>
+            </p:txBody>
+          </p:sp>
+        </mc:Fallback>
+      </mc:AlternateContent>
+      <p:sp>
+        <p:nvSpPr>
+          <p:cNvPr id="35" name="Rectangle 16">
+            <a:extLst>
+              <a:ext uri="{FF2B5EF4-FFF2-40B4-BE49-F238E27FC236}">
+                <a16:creationId xmlns:a16="http://schemas.microsoft.com/office/drawing/2014/main" id="{6B7806E7-DA32-488B-B3C7-D444A0E6F73A}"/>
+              </a:ext>
+            </a:extLst>
+          </p:cNvPr>
+          <p:cNvSpPr/>
+          <p:nvPr/>
+        </p:nvSpPr>
+        <p:spPr>
+          <a:xfrm flipH="1">
+            <a:off x="2260532" y="994389"/>
+            <a:ext cx="2402935" cy="816376"/>
+          </a:xfrm>
+          <a:custGeom>
+            <a:avLst/>
+            <a:gdLst>
+              <a:gd name="connsiteX0" fmla="*/ 0 w 4924323"/>
+              <a:gd name="connsiteY0" fmla="*/ 0 h 3649982"/>
+              <a:gd name="connsiteX1" fmla="*/ 4924323 w 4924323"/>
+              <a:gd name="connsiteY1" fmla="*/ 0 h 3649982"/>
+              <a:gd name="connsiteX2" fmla="*/ 4924323 w 4924323"/>
+              <a:gd name="connsiteY2" fmla="*/ 3649982 h 3649982"/>
+              <a:gd name="connsiteX3" fmla="*/ 0 w 4924323"/>
+              <a:gd name="connsiteY3" fmla="*/ 3649982 h 3649982"/>
+              <a:gd name="connsiteX4" fmla="*/ 0 w 4924323"/>
+              <a:gd name="connsiteY4" fmla="*/ 0 h 3649982"/>
+              <a:gd name="connsiteX0" fmla="*/ 0 w 4924323"/>
+              <a:gd name="connsiteY0" fmla="*/ 0 h 3649982"/>
+              <a:gd name="connsiteX1" fmla="*/ 2650906 w 4924323"/>
+              <a:gd name="connsiteY1" fmla="*/ 1543574 h 3649982"/>
+              <a:gd name="connsiteX2" fmla="*/ 4924323 w 4924323"/>
+              <a:gd name="connsiteY2" fmla="*/ 3649982 h 3649982"/>
+              <a:gd name="connsiteX3" fmla="*/ 0 w 4924323"/>
+              <a:gd name="connsiteY3" fmla="*/ 3649982 h 3649982"/>
+              <a:gd name="connsiteX4" fmla="*/ 0 w 4924323"/>
+              <a:gd name="connsiteY4" fmla="*/ 0 h 3649982"/>
+              <a:gd name="connsiteX0" fmla="*/ 0 w 4924323"/>
+              <a:gd name="connsiteY0" fmla="*/ 0 h 3649982"/>
+              <a:gd name="connsiteX1" fmla="*/ 2650906 w 4924323"/>
+              <a:gd name="connsiteY1" fmla="*/ 1543574 h 3649982"/>
+              <a:gd name="connsiteX2" fmla="*/ 4924323 w 4924323"/>
+              <a:gd name="connsiteY2" fmla="*/ 3649982 h 3649982"/>
+              <a:gd name="connsiteX3" fmla="*/ 0 w 4924323"/>
+              <a:gd name="connsiteY3" fmla="*/ 3649982 h 3649982"/>
+              <a:gd name="connsiteX4" fmla="*/ 0 w 4924323"/>
+              <a:gd name="connsiteY4" fmla="*/ 0 h 3649982"/>
+              <a:gd name="connsiteX0" fmla="*/ 0 w 4924323"/>
+              <a:gd name="connsiteY0" fmla="*/ 0 h 3649982"/>
+              <a:gd name="connsiteX1" fmla="*/ 2650906 w 4924323"/>
+              <a:gd name="connsiteY1" fmla="*/ 1543574 h 3649982"/>
+              <a:gd name="connsiteX2" fmla="*/ 4924323 w 4924323"/>
+              <a:gd name="connsiteY2" fmla="*/ 3649982 h 3649982"/>
+              <a:gd name="connsiteX3" fmla="*/ 0 w 4924323"/>
+              <a:gd name="connsiteY3" fmla="*/ 3649982 h 3649982"/>
+              <a:gd name="connsiteX4" fmla="*/ 0 w 4924323"/>
+              <a:gd name="connsiteY4" fmla="*/ 0 h 3649982"/>
+              <a:gd name="connsiteX0" fmla="*/ 0 w 4924323"/>
+              <a:gd name="connsiteY0" fmla="*/ 56410 h 3706392"/>
+              <a:gd name="connsiteX1" fmla="*/ 2650906 w 4924323"/>
+              <a:gd name="connsiteY1" fmla="*/ 1599984 h 3706392"/>
+              <a:gd name="connsiteX2" fmla="*/ 4924323 w 4924323"/>
+              <a:gd name="connsiteY2" fmla="*/ 3706392 h 3706392"/>
+              <a:gd name="connsiteX3" fmla="*/ 0 w 4924323"/>
+              <a:gd name="connsiteY3" fmla="*/ 3706392 h 3706392"/>
+              <a:gd name="connsiteX4" fmla="*/ 0 w 4924323"/>
+              <a:gd name="connsiteY4" fmla="*/ 56410 h 3706392"/>
+              <a:gd name="connsiteX0" fmla="*/ 0 w 4924323"/>
+              <a:gd name="connsiteY0" fmla="*/ 63809 h 3713791"/>
+              <a:gd name="connsiteX1" fmla="*/ 2650906 w 4924323"/>
+              <a:gd name="connsiteY1" fmla="*/ 1607383 h 3713791"/>
+              <a:gd name="connsiteX2" fmla="*/ 4924323 w 4924323"/>
+              <a:gd name="connsiteY2" fmla="*/ 3713791 h 3713791"/>
+              <a:gd name="connsiteX3" fmla="*/ 0 w 4924323"/>
+              <a:gd name="connsiteY3" fmla="*/ 3713791 h 3713791"/>
+              <a:gd name="connsiteX4" fmla="*/ 0 w 4924323"/>
+              <a:gd name="connsiteY4" fmla="*/ 63809 h 3713791"/>
+              <a:gd name="connsiteX0" fmla="*/ 0 w 4924323"/>
+              <a:gd name="connsiteY0" fmla="*/ 0 h 3649982"/>
+              <a:gd name="connsiteX1" fmla="*/ 2650906 w 4924323"/>
+              <a:gd name="connsiteY1" fmla="*/ 1543574 h 3649982"/>
+              <a:gd name="connsiteX2" fmla="*/ 4924323 w 4924323"/>
+              <a:gd name="connsiteY2" fmla="*/ 3649982 h 3649982"/>
+              <a:gd name="connsiteX3" fmla="*/ 0 w 4924323"/>
+              <a:gd name="connsiteY3" fmla="*/ 3649982 h 3649982"/>
+              <a:gd name="connsiteX4" fmla="*/ 0 w 4924323"/>
+              <a:gd name="connsiteY4" fmla="*/ 0 h 3649982"/>
+              <a:gd name="connsiteX0" fmla="*/ 0 w 4924323"/>
+              <a:gd name="connsiteY0" fmla="*/ 0 h 3649982"/>
+              <a:gd name="connsiteX1" fmla="*/ 3305247 w 4924323"/>
+              <a:gd name="connsiteY1" fmla="*/ 1333849 h 3649982"/>
+              <a:gd name="connsiteX2" fmla="*/ 4924323 w 4924323"/>
+              <a:gd name="connsiteY2" fmla="*/ 3649982 h 3649982"/>
+              <a:gd name="connsiteX3" fmla="*/ 0 w 4924323"/>
+              <a:gd name="connsiteY3" fmla="*/ 3649982 h 3649982"/>
+              <a:gd name="connsiteX4" fmla="*/ 0 w 4924323"/>
+              <a:gd name="connsiteY4" fmla="*/ 0 h 3649982"/>
+              <a:gd name="connsiteX0" fmla="*/ 0 w 4924323"/>
+              <a:gd name="connsiteY0" fmla="*/ 0 h 3649982"/>
+              <a:gd name="connsiteX1" fmla="*/ 3305247 w 4924323"/>
+              <a:gd name="connsiteY1" fmla="*/ 1333849 h 3649982"/>
+              <a:gd name="connsiteX2" fmla="*/ 4924323 w 4924323"/>
+              <a:gd name="connsiteY2" fmla="*/ 3649982 h 3649982"/>
+              <a:gd name="connsiteX3" fmla="*/ 0 w 4924323"/>
+              <a:gd name="connsiteY3" fmla="*/ 3649982 h 3649982"/>
+              <a:gd name="connsiteX4" fmla="*/ 0 w 4924323"/>
+              <a:gd name="connsiteY4" fmla="*/ 0 h 3649982"/>
+              <a:gd name="connsiteX0" fmla="*/ 0 w 4924323"/>
+              <a:gd name="connsiteY0" fmla="*/ 0 h 3649982"/>
+              <a:gd name="connsiteX1" fmla="*/ 3263302 w 4924323"/>
+              <a:gd name="connsiteY1" fmla="*/ 1115736 h 3649982"/>
+              <a:gd name="connsiteX2" fmla="*/ 4924323 w 4924323"/>
+              <a:gd name="connsiteY2" fmla="*/ 3649982 h 3649982"/>
+              <a:gd name="connsiteX3" fmla="*/ 0 w 4924323"/>
+              <a:gd name="connsiteY3" fmla="*/ 3649982 h 3649982"/>
+              <a:gd name="connsiteX4" fmla="*/ 0 w 4924323"/>
+              <a:gd name="connsiteY4" fmla="*/ 0 h 3649982"/>
+              <a:gd name="connsiteX0" fmla="*/ 0 w 4924323"/>
+              <a:gd name="connsiteY0" fmla="*/ 0 h 3649982"/>
+              <a:gd name="connsiteX1" fmla="*/ 3263302 w 4924323"/>
+              <a:gd name="connsiteY1" fmla="*/ 1115736 h 3649982"/>
+              <a:gd name="connsiteX2" fmla="*/ 4924323 w 4924323"/>
+              <a:gd name="connsiteY2" fmla="*/ 3649982 h 3649982"/>
+              <a:gd name="connsiteX3" fmla="*/ 0 w 4924323"/>
+              <a:gd name="connsiteY3" fmla="*/ 3649982 h 3649982"/>
+              <a:gd name="connsiteX4" fmla="*/ 0 w 4924323"/>
+              <a:gd name="connsiteY4" fmla="*/ 0 h 3649982"/>
+              <a:gd name="connsiteX0" fmla="*/ 0 w 4924323"/>
+              <a:gd name="connsiteY0" fmla="*/ 0 h 3649982"/>
+              <a:gd name="connsiteX1" fmla="*/ 3263302 w 4924323"/>
+              <a:gd name="connsiteY1" fmla="*/ 1115736 h 3649982"/>
+              <a:gd name="connsiteX2" fmla="*/ 4924323 w 4924323"/>
+              <a:gd name="connsiteY2" fmla="*/ 3649982 h 3649982"/>
+              <a:gd name="connsiteX3" fmla="*/ 0 w 4924323"/>
+              <a:gd name="connsiteY3" fmla="*/ 3649982 h 3649982"/>
+              <a:gd name="connsiteX4" fmla="*/ 0 w 4924323"/>
+              <a:gd name="connsiteY4" fmla="*/ 0 h 3649982"/>
+              <a:gd name="connsiteX0" fmla="*/ 0 w 4924323"/>
+              <a:gd name="connsiteY0" fmla="*/ 0 h 3649982"/>
+              <a:gd name="connsiteX1" fmla="*/ 3263302 w 4924323"/>
+              <a:gd name="connsiteY1" fmla="*/ 1115736 h 3649982"/>
+              <a:gd name="connsiteX2" fmla="*/ 4924323 w 4924323"/>
+              <a:gd name="connsiteY2" fmla="*/ 3649982 h 3649982"/>
+              <a:gd name="connsiteX3" fmla="*/ 0 w 4924323"/>
+              <a:gd name="connsiteY3" fmla="*/ 0 h 3649982"/>
+              <a:gd name="connsiteX0" fmla="*/ 4924323 w 5015763"/>
+              <a:gd name="connsiteY0" fmla="*/ 3649982 h 3741422"/>
+              <a:gd name="connsiteX1" fmla="*/ 0 w 5015763"/>
+              <a:gd name="connsiteY1" fmla="*/ 0 h 3741422"/>
+              <a:gd name="connsiteX2" fmla="*/ 3263302 w 5015763"/>
+              <a:gd name="connsiteY2" fmla="*/ 1115736 h 3741422"/>
+              <a:gd name="connsiteX3" fmla="*/ 5015763 w 5015763"/>
+              <a:gd name="connsiteY3" fmla="*/ 3741422 h 3741422"/>
+              <a:gd name="connsiteX0" fmla="*/ 0 w 5015763"/>
+              <a:gd name="connsiteY0" fmla="*/ 0 h 3741422"/>
+              <a:gd name="connsiteX1" fmla="*/ 3263302 w 5015763"/>
+              <a:gd name="connsiteY1" fmla="*/ 1115736 h 3741422"/>
+              <a:gd name="connsiteX2" fmla="*/ 5015763 w 5015763"/>
+              <a:gd name="connsiteY2" fmla="*/ 3741422 h 3741422"/>
+              <a:gd name="connsiteX0" fmla="*/ 0 w 3263302"/>
+              <a:gd name="connsiteY0" fmla="*/ 0 h 1115736"/>
+              <a:gd name="connsiteX1" fmla="*/ 3263302 w 3263302"/>
+              <a:gd name="connsiteY1" fmla="*/ 1115736 h 1115736"/>
+            </a:gdLst>
+            <a:ahLst/>
+            <a:cxnLst>
+              <a:cxn ang="0">
+                <a:pos x="connsiteX0" y="connsiteY0"/>
+              </a:cxn>
+              <a:cxn ang="0">
+                <a:pos x="connsiteX1" y="connsiteY1"/>
+              </a:cxn>
+            </a:cxnLst>
+            <a:rect l="l" t="t" r="r" b="b"/>
+            <a:pathLst>
+              <a:path w="3263302" h="1115736">
+                <a:moveTo>
+                  <a:pt x="0" y="0"/>
+                </a:moveTo>
+                <a:cubicBezTo>
+                  <a:pt x="1138104" y="143883"/>
+                  <a:pt x="2498040" y="438964"/>
+                  <a:pt x="3263302" y="1115736"/>
+                </a:cubicBezTo>
+              </a:path>
+            </a:pathLst>
+          </a:custGeom>
+          <a:noFill/>
+          <a:ln w="50800" cap="flat" cmpd="sng" algn="ctr">
+            <a:solidFill>
+              <a:schemeClr val="tx1">
+                <a:lumMod val="65000"/>
+              </a:schemeClr>
+            </a:solidFill>
+            <a:prstDash val="solid"/>
+            <a:miter lim="800000"/>
+          </a:ln>
+          <a:effectLst/>
+        </p:spPr>
+        <p:txBody>
+          <a:bodyPr rot="0" spcFirstLastPara="0" vertOverflow="overflow" horzOverflow="overflow" vert="horz" wrap="square" lIns="68580" tIns="34290" rIns="68580" bIns="34290" numCol="1" spcCol="0" rtlCol="0" fromWordArt="0" anchor="ctr" anchorCtr="0" forceAA="0" compatLnSpc="1">
+            <a:prstTxWarp prst="textNoShape">
+              <a:avLst/>
+            </a:prstTxWarp>
+            <a:noAutofit/>
+          </a:bodyPr>
+          <a:lstStyle/>
+          <a:p>
+            <a:pPr algn="ctr" defTabSz="457200">
+              <a:defRPr/>
+            </a:pPr>
+            <a:endParaRPr lang="fr-FR" sz="1400" kern="0" dirty="0">
+              <a:solidFill>
+                <a:prstClr val="white"/>
+              </a:solidFill>
+            </a:endParaRPr>
+          </a:p>
+        </p:txBody>
+      </p:sp>
+    </p:spTree>
+    <p:extLst>
+      <p:ext uri="{BB962C8B-B14F-4D97-AF65-F5344CB8AC3E}">
+        <p14:creationId xmlns:p14="http://schemas.microsoft.com/office/powerpoint/2010/main" val="2335471120"/>
       </p:ext>
     </p:extLst>
   </p:cSld>

</xml_diff>